<commit_message>
an extra example and a small fix to lab 9
</commit_message>
<xml_diff>
--- a/classes/stats2020/Lecture18C_PCA_Examples.pptx
+++ b/classes/stats2020/Lecture18C_PCA_Examples.pptx
@@ -5,21 +5,29 @@
     <p:sldMasterId id="2147483648" r:id="rId1"/>
   </p:sldMasterIdLst>
   <p:notesMasterIdLst>
-    <p:notesMasterId r:id="rId14"/>
+    <p:notesMasterId r:id="rId22"/>
   </p:notesMasterIdLst>
   <p:sldIdLst>
-    <p:sldId id="282" r:id="rId2"/>
-    <p:sldId id="283" r:id="rId3"/>
-    <p:sldId id="284" r:id="rId4"/>
-    <p:sldId id="285" r:id="rId5"/>
-    <p:sldId id="286" r:id="rId6"/>
-    <p:sldId id="335" r:id="rId7"/>
-    <p:sldId id="336" r:id="rId8"/>
-    <p:sldId id="337" r:id="rId9"/>
-    <p:sldId id="338" r:id="rId10"/>
-    <p:sldId id="339" r:id="rId11"/>
-    <p:sldId id="340" r:id="rId12"/>
-    <p:sldId id="341" r:id="rId13"/>
+    <p:sldId id="324" r:id="rId2"/>
+    <p:sldId id="325" r:id="rId3"/>
+    <p:sldId id="326" r:id="rId4"/>
+    <p:sldId id="327" r:id="rId5"/>
+    <p:sldId id="328" r:id="rId6"/>
+    <p:sldId id="329" r:id="rId7"/>
+    <p:sldId id="330" r:id="rId8"/>
+    <p:sldId id="331" r:id="rId9"/>
+    <p:sldId id="282" r:id="rId10"/>
+    <p:sldId id="283" r:id="rId11"/>
+    <p:sldId id="284" r:id="rId12"/>
+    <p:sldId id="285" r:id="rId13"/>
+    <p:sldId id="286" r:id="rId14"/>
+    <p:sldId id="335" r:id="rId15"/>
+    <p:sldId id="336" r:id="rId16"/>
+    <p:sldId id="337" r:id="rId17"/>
+    <p:sldId id="338" r:id="rId18"/>
+    <p:sldId id="339" r:id="rId19"/>
+    <p:sldId id="340" r:id="rId20"/>
+    <p:sldId id="341" r:id="rId21"/>
   </p:sldIdLst>
   <p:sldSz cx="9144000" cy="6858000" type="screen4x3"/>
   <p:notesSz cx="6858000" cy="9144000"/>
@@ -891,7 +899,7 @@
             <a:fld id="{A5CD60B2-D670-4B07-B8C3-54BFAC9277E2}" type="slidenum">
               <a:rPr lang="en-US" altLang="en-US" sz="1200" smtClean="0"/>
               <a:pPr/>
-              <a:t>1</a:t>
+              <a:t>9</a:t>
             </a:fld>
             <a:endParaRPr lang="en-US" altLang="en-US" sz="1200"/>
           </a:p>
@@ -1134,7 +1142,7 @@
             <a:fld id="{48C15022-D966-4920-9256-3C0DE2EFB0CE}" type="slidenum">
               <a:rPr lang="en-US" altLang="en-US" sz="1200" smtClean="0"/>
               <a:pPr/>
-              <a:t>2</a:t>
+              <a:t>10</a:t>
             </a:fld>
             <a:endParaRPr lang="en-US" altLang="en-US" sz="1200"/>
           </a:p>
@@ -1377,7 +1385,7 @@
             <a:fld id="{B5E807A8-AD23-41C2-9264-29E6C31B08D7}" type="slidenum">
               <a:rPr lang="en-US" altLang="en-US" sz="1200" smtClean="0"/>
               <a:pPr/>
-              <a:t>3</a:t>
+              <a:t>11</a:t>
             </a:fld>
             <a:endParaRPr lang="en-US" altLang="en-US" sz="1200"/>
           </a:p>
@@ -1620,7 +1628,7 @@
             <a:fld id="{FF9AE09F-8DC6-490A-9DCB-A2980BC135D3}" type="slidenum">
               <a:rPr lang="en-US" altLang="en-US" sz="1200" smtClean="0"/>
               <a:pPr/>
-              <a:t>4</a:t>
+              <a:t>12</a:t>
             </a:fld>
             <a:endParaRPr lang="en-US" altLang="en-US" sz="1200"/>
           </a:p>
@@ -1863,7 +1871,7 @@
             <a:fld id="{5259318A-C650-49F7-8B4E-AD15DC8D01B6}" type="slidenum">
               <a:rPr lang="en-US" altLang="en-US" sz="1200" smtClean="0"/>
               <a:pPr/>
-              <a:t>5</a:t>
+              <a:t>13</a:t>
             </a:fld>
             <a:endParaRPr lang="en-US" altLang="en-US" sz="1200"/>
           </a:p>
@@ -5482,28 +5490,45 @@
           <a:chExt cx="0" cy="0"/>
         </a:xfrm>
       </p:grpSpPr>
+      <p:sp>
+        <p:nvSpPr>
+          <p:cNvPr id="4" name="TextBox 3"/>
+          <p:cNvSpPr txBox="1"/>
+          <p:nvPr/>
+        </p:nvSpPr>
+        <p:spPr>
+          <a:xfrm>
+            <a:off x="914400" y="152400"/>
+            <a:ext cx="4477123" cy="369332"/>
+          </a:xfrm>
+          <a:prstGeom prst="rect">
+            <a:avLst/>
+          </a:prstGeom>
+          <a:noFill/>
+        </p:spPr>
+        <p:txBody>
+          <a:bodyPr wrap="none" rtlCol="0">
+            <a:spAutoFit/>
+          </a:bodyPr>
+          <a:lstStyle/>
+          <a:p>
+            <a:r>
+              <a:rPr lang="en-US" dirty="0"/>
+              <a:t>Consider the relationship between x and x ^ 2</a:t>
+            </a:r>
+          </a:p>
+        </p:txBody>
+      </p:sp>
       <p:pic>
         <p:nvPicPr>
-          <p:cNvPr id="75778" name="Picture 3">
-            <a:extLst>
-              <a:ext uri="{FF2B5EF4-FFF2-40B4-BE49-F238E27FC236}">
-                <a16:creationId xmlns:a16="http://schemas.microsoft.com/office/drawing/2014/main" id="{52DBCA38-2D4C-442C-83FC-6A9A3F41C409}"/>
-              </a:ext>
-            </a:extLst>
-          </p:cNvPr>
+          <p:cNvPr id="1026" name="Picture 2"/>
           <p:cNvPicPr>
             <a:picLocks noChangeAspect="1" noChangeArrowheads="1"/>
           </p:cNvPicPr>
           <p:nvPr/>
         </p:nvPicPr>
         <p:blipFill>
-          <a:blip r:embed="rId3">
-            <a:extLst>
-              <a:ext uri="{28A0092B-C50C-407E-A947-70E740481C1C}">
-                <a14:useLocalDpi xmlns:a14="http://schemas.microsoft.com/office/drawing/2010/main" val="0"/>
-              </a:ext>
-            </a:extLst>
-          </a:blip>
+          <a:blip r:embed="rId2" cstate="print"/>
           <a:srcRect/>
           <a:stretch>
             <a:fillRect/>
@@ -5511,384 +5536,80 @@
         </p:blipFill>
         <p:spPr bwMode="auto">
           <a:xfrm>
-            <a:off x="57150" y="449263"/>
-            <a:ext cx="8553450" cy="6027737"/>
+            <a:off x="609600" y="609600"/>
+            <a:ext cx="4105275" cy="1247775"/>
           </a:xfrm>
           <a:prstGeom prst="rect">
             <a:avLst/>
           </a:prstGeom>
           <a:noFill/>
-          <a:ln>
+          <a:ln w="9525">
             <a:noFill/>
+            <a:miter lim="800000"/>
+            <a:headEnd/>
+            <a:tailEnd/>
           </a:ln>
-          <a:extLst>
-            <a:ext uri="{909E8E84-426E-40DD-AFC4-6F175D3DCCD1}">
-              <a14:hiddenFill xmlns:a14="http://schemas.microsoft.com/office/drawing/2010/main">
-                <a:solidFill>
-                  <a:srgbClr val="FFFFFF"/>
-                </a:solidFill>
-              </a14:hiddenFill>
-            </a:ext>
-            <a:ext uri="{91240B29-F687-4F45-9708-019B960494DF}">
-              <a14:hiddenLine xmlns:a14="http://schemas.microsoft.com/office/drawing/2010/main" w="9525">
-                <a:solidFill>
-                  <a:srgbClr val="000000"/>
-                </a:solidFill>
-                <a:miter lim="800000"/>
-                <a:headEnd/>
-                <a:tailEnd/>
-              </a14:hiddenLine>
-            </a:ext>
-          </a:extLst>
         </p:spPr>
       </p:pic>
-      <p:sp>
-        <p:nvSpPr>
-          <p:cNvPr id="75779" name="TextBox 3">
-            <a:extLst>
-              <a:ext uri="{FF2B5EF4-FFF2-40B4-BE49-F238E27FC236}">
-                <a16:creationId xmlns:a16="http://schemas.microsoft.com/office/drawing/2014/main" id="{413908F6-2BF4-4E04-94CE-342295FCE521}"/>
-              </a:ext>
-            </a:extLst>
-          </p:cNvPr>
-          <p:cNvSpPr txBox="1">
-            <a:spLocks noChangeArrowheads="1"/>
-          </p:cNvSpPr>
+      <p:pic>
+        <p:nvPicPr>
+          <p:cNvPr id="1027" name="Picture 3"/>
+          <p:cNvPicPr>
+            <a:picLocks noChangeAspect="1" noChangeArrowheads="1"/>
+          </p:cNvPicPr>
           <p:nvPr/>
-        </p:nvSpPr>
+        </p:nvPicPr>
+        <p:blipFill>
+          <a:blip r:embed="rId3" cstate="print"/>
+          <a:srcRect/>
+          <a:stretch>
+            <a:fillRect/>
+          </a:stretch>
+        </p:blipFill>
         <p:spPr bwMode="auto">
           <a:xfrm>
-            <a:off x="228600" y="76200"/>
-            <a:ext cx="3230563" cy="369888"/>
+            <a:off x="3429000" y="1905000"/>
+            <a:ext cx="4767262" cy="4392639"/>
           </a:xfrm>
           <a:prstGeom prst="rect">
             <a:avLst/>
           </a:prstGeom>
           <a:noFill/>
-          <a:ln>
+          <a:ln w="9525">
             <a:noFill/>
+            <a:miter lim="800000"/>
+            <a:headEnd/>
+            <a:tailEnd/>
           </a:ln>
-          <a:extLst>
-            <a:ext uri="{909E8E84-426E-40DD-AFC4-6F175D3DCCD1}">
-              <a14:hiddenFill xmlns:a14="http://schemas.microsoft.com/office/drawing/2010/main">
-                <a:solidFill>
-                  <a:srgbClr val="FFFFFF"/>
-                </a:solidFill>
-              </a14:hiddenFill>
-            </a:ext>
-            <a:ext uri="{91240B29-F687-4F45-9708-019B960494DF}">
-              <a14:hiddenLine xmlns:a14="http://schemas.microsoft.com/office/drawing/2010/main" w="9525">
-                <a:solidFill>
-                  <a:srgbClr val="000000"/>
-                </a:solidFill>
-                <a:miter lim="800000"/>
-                <a:headEnd/>
-                <a:tailEnd/>
-              </a14:hiddenLine>
-            </a:ext>
-          </a:extLst>
-        </p:spPr>
-        <p:txBody>
-          <a:bodyPr wrap="none">
-            <a:spAutoFit/>
-          </a:bodyPr>
-          <a:lstStyle>
-            <a:lvl1pPr>
-              <a:defRPr sz="2400">
-                <a:solidFill>
-                  <a:schemeClr val="tx1"/>
-                </a:solidFill>
-                <a:latin typeface="Times New Roman" panose="02020603050405020304" pitchFamily="18" charset="0"/>
-              </a:defRPr>
-            </a:lvl1pPr>
-            <a:lvl2pPr marL="742950" indent="-285750">
-              <a:defRPr sz="2400">
-                <a:solidFill>
-                  <a:schemeClr val="tx1"/>
-                </a:solidFill>
-                <a:latin typeface="Times New Roman" panose="02020603050405020304" pitchFamily="18" charset="0"/>
-              </a:defRPr>
-            </a:lvl2pPr>
-            <a:lvl3pPr marL="1143000" indent="-228600">
-              <a:defRPr sz="2400">
-                <a:solidFill>
-                  <a:schemeClr val="tx1"/>
-                </a:solidFill>
-                <a:latin typeface="Times New Roman" panose="02020603050405020304" pitchFamily="18" charset="0"/>
-              </a:defRPr>
-            </a:lvl3pPr>
-            <a:lvl4pPr marL="1600200" indent="-228600">
-              <a:defRPr sz="2400">
-                <a:solidFill>
-                  <a:schemeClr val="tx1"/>
-                </a:solidFill>
-                <a:latin typeface="Times New Roman" panose="02020603050405020304" pitchFamily="18" charset="0"/>
-              </a:defRPr>
-            </a:lvl4pPr>
-            <a:lvl5pPr marL="2057400" indent="-228600">
-              <a:defRPr sz="2400">
-                <a:solidFill>
-                  <a:schemeClr val="tx1"/>
-                </a:solidFill>
-                <a:latin typeface="Times New Roman" panose="02020603050405020304" pitchFamily="18" charset="0"/>
-              </a:defRPr>
-            </a:lvl5pPr>
-            <a:lvl6pPr marL="2514600" indent="-228600" eaLnBrk="0" fontAlgn="base" hangingPunct="0">
-              <a:spcBef>
-                <a:spcPct val="0"/>
-              </a:spcBef>
-              <a:spcAft>
-                <a:spcPct val="0"/>
-              </a:spcAft>
-              <a:defRPr sz="2400">
-                <a:solidFill>
-                  <a:schemeClr val="tx1"/>
-                </a:solidFill>
-                <a:latin typeface="Times New Roman" panose="02020603050405020304" pitchFamily="18" charset="0"/>
-              </a:defRPr>
-            </a:lvl6pPr>
-            <a:lvl7pPr marL="2971800" indent="-228600" eaLnBrk="0" fontAlgn="base" hangingPunct="0">
-              <a:spcBef>
-                <a:spcPct val="0"/>
-              </a:spcBef>
-              <a:spcAft>
-                <a:spcPct val="0"/>
-              </a:spcAft>
-              <a:defRPr sz="2400">
-                <a:solidFill>
-                  <a:schemeClr val="tx1"/>
-                </a:solidFill>
-                <a:latin typeface="Times New Roman" panose="02020603050405020304" pitchFamily="18" charset="0"/>
-              </a:defRPr>
-            </a:lvl7pPr>
-            <a:lvl8pPr marL="3429000" indent="-228600" eaLnBrk="0" fontAlgn="base" hangingPunct="0">
-              <a:spcBef>
-                <a:spcPct val="0"/>
-              </a:spcBef>
-              <a:spcAft>
-                <a:spcPct val="0"/>
-              </a:spcAft>
-              <a:defRPr sz="2400">
-                <a:solidFill>
-                  <a:schemeClr val="tx1"/>
-                </a:solidFill>
-                <a:latin typeface="Times New Roman" panose="02020603050405020304" pitchFamily="18" charset="0"/>
-              </a:defRPr>
-            </a:lvl8pPr>
-            <a:lvl9pPr marL="3886200" indent="-228600" eaLnBrk="0" fontAlgn="base" hangingPunct="0">
-              <a:spcBef>
-                <a:spcPct val="0"/>
-              </a:spcBef>
-              <a:spcAft>
-                <a:spcPct val="0"/>
-              </a:spcAft>
-              <a:defRPr sz="2400">
-                <a:solidFill>
-                  <a:schemeClr val="tx1"/>
-                </a:solidFill>
-                <a:latin typeface="Times New Roman" panose="02020603050405020304" pitchFamily="18" charset="0"/>
-              </a:defRPr>
-            </a:lvl9pPr>
-          </a:lstStyle>
-          <a:p>
-            <a:r>
-              <a:rPr lang="en-US" altLang="en-US"/>
-              <a:t>Let’s return to the gala dataset…</a:t>
-            </a:r>
-          </a:p>
-        </p:txBody>
-      </p:sp>
-      <p:cxnSp>
-        <p:nvCxnSpPr>
-          <p:cNvPr id="6" name="Straight Arrow Connector 5">
-            <a:extLst>
-              <a:ext uri="{FF2B5EF4-FFF2-40B4-BE49-F238E27FC236}">
-                <a16:creationId xmlns:a16="http://schemas.microsoft.com/office/drawing/2014/main" id="{5A789A2B-1A08-4E73-B6EE-C1BC930AEE8F}"/>
-              </a:ext>
-            </a:extLst>
-          </p:cNvPr>
-          <p:cNvCxnSpPr/>
+        </p:spPr>
+      </p:pic>
+      <p:sp>
+        <p:nvSpPr>
+          <p:cNvPr id="7" name="Rectangle 6"/>
+          <p:cNvSpPr/>
           <p:nvPr/>
-        </p:nvCxnSpPr>
+        </p:nvSpPr>
         <p:spPr>
-          <a:xfrm rot="5400000" flipH="1" flipV="1">
-            <a:off x="2857501" y="6515100"/>
-            <a:ext cx="381000" cy="3175"/>
-          </a:xfrm>
-          <a:prstGeom prst="straightConnector1">
-            <a:avLst/>
-          </a:prstGeom>
-          <a:ln>
-            <a:tailEnd type="arrow"/>
-          </a:ln>
-        </p:spPr>
-        <p:style>
-          <a:lnRef idx="1">
-            <a:schemeClr val="accent1"/>
-          </a:lnRef>
-          <a:fillRef idx="0">
-            <a:schemeClr val="accent1"/>
-          </a:fillRef>
-          <a:effectRef idx="0">
-            <a:schemeClr val="accent1"/>
-          </a:effectRef>
-          <a:fontRef idx="minor">
-            <a:schemeClr val="tx1"/>
-          </a:fontRef>
-        </p:style>
-      </p:cxnSp>
-      <p:sp>
-        <p:nvSpPr>
-          <p:cNvPr id="75781" name="TextBox 6">
-            <a:extLst>
-              <a:ext uri="{FF2B5EF4-FFF2-40B4-BE49-F238E27FC236}">
-                <a16:creationId xmlns:a16="http://schemas.microsoft.com/office/drawing/2014/main" id="{E64B31C3-3347-47B9-B38E-B85D84C74B98}"/>
-              </a:ext>
-            </a:extLst>
-          </p:cNvPr>
-          <p:cNvSpPr txBox="1">
-            <a:spLocks noChangeArrowheads="1"/>
-          </p:cNvSpPr>
-          <p:nvPr/>
-        </p:nvSpPr>
-        <p:spPr bwMode="auto">
           <a:xfrm>
-            <a:off x="708025" y="6477000"/>
-            <a:ext cx="5616575" cy="369888"/>
+            <a:off x="76200" y="6474023"/>
+            <a:ext cx="11658600" cy="307777"/>
           </a:xfrm>
           <a:prstGeom prst="rect">
             <a:avLst/>
           </a:prstGeom>
-          <a:noFill/>
-          <a:ln>
-            <a:noFill/>
-          </a:ln>
-          <a:extLst>
-            <a:ext uri="{909E8E84-426E-40DD-AFC4-6F175D3DCCD1}">
-              <a14:hiddenFill xmlns:a14="http://schemas.microsoft.com/office/drawing/2010/main">
-                <a:solidFill>
-                  <a:srgbClr val="FFFFFF"/>
-                </a:solidFill>
-              </a14:hiddenFill>
-            </a:ext>
-            <a:ext uri="{91240B29-F687-4F45-9708-019B960494DF}">
-              <a14:hiddenLine xmlns:a14="http://schemas.microsoft.com/office/drawing/2010/main" w="9525">
-                <a:solidFill>
-                  <a:srgbClr val="000000"/>
-                </a:solidFill>
-                <a:miter lim="800000"/>
-                <a:headEnd/>
-                <a:tailEnd/>
-              </a14:hiddenLine>
-            </a:ext>
-          </a:extLst>
-        </p:spPr>
-        <p:txBody>
-          <a:bodyPr wrap="none">
+        </p:spPr>
+        <p:txBody>
+          <a:bodyPr wrap="square">
             <a:spAutoFit/>
           </a:bodyPr>
-          <a:lstStyle>
-            <a:lvl1pPr>
-              <a:defRPr sz="2400">
-                <a:solidFill>
-                  <a:schemeClr val="tx1"/>
-                </a:solidFill>
-                <a:latin typeface="Times New Roman" panose="02020603050405020304" pitchFamily="18" charset="0"/>
-              </a:defRPr>
-            </a:lvl1pPr>
-            <a:lvl2pPr marL="742950" indent="-285750">
-              <a:defRPr sz="2400">
-                <a:solidFill>
-                  <a:schemeClr val="tx1"/>
-                </a:solidFill>
-                <a:latin typeface="Times New Roman" panose="02020603050405020304" pitchFamily="18" charset="0"/>
-              </a:defRPr>
-            </a:lvl2pPr>
-            <a:lvl3pPr marL="1143000" indent="-228600">
-              <a:defRPr sz="2400">
-                <a:solidFill>
-                  <a:schemeClr val="tx1"/>
-                </a:solidFill>
-                <a:latin typeface="Times New Roman" panose="02020603050405020304" pitchFamily="18" charset="0"/>
-              </a:defRPr>
-            </a:lvl3pPr>
-            <a:lvl4pPr marL="1600200" indent="-228600">
-              <a:defRPr sz="2400">
-                <a:solidFill>
-                  <a:schemeClr val="tx1"/>
-                </a:solidFill>
-                <a:latin typeface="Times New Roman" panose="02020603050405020304" pitchFamily="18" charset="0"/>
-              </a:defRPr>
-            </a:lvl4pPr>
-            <a:lvl5pPr marL="2057400" indent="-228600">
-              <a:defRPr sz="2400">
-                <a:solidFill>
-                  <a:schemeClr val="tx1"/>
-                </a:solidFill>
-                <a:latin typeface="Times New Roman" panose="02020603050405020304" pitchFamily="18" charset="0"/>
-              </a:defRPr>
-            </a:lvl5pPr>
-            <a:lvl6pPr marL="2514600" indent="-228600" eaLnBrk="0" fontAlgn="base" hangingPunct="0">
-              <a:spcBef>
-                <a:spcPct val="0"/>
-              </a:spcBef>
-              <a:spcAft>
-                <a:spcPct val="0"/>
-              </a:spcAft>
-              <a:defRPr sz="2400">
-                <a:solidFill>
-                  <a:schemeClr val="tx1"/>
-                </a:solidFill>
-                <a:latin typeface="Times New Roman" panose="02020603050405020304" pitchFamily="18" charset="0"/>
-              </a:defRPr>
-            </a:lvl6pPr>
-            <a:lvl7pPr marL="2971800" indent="-228600" eaLnBrk="0" fontAlgn="base" hangingPunct="0">
-              <a:spcBef>
-                <a:spcPct val="0"/>
-              </a:spcBef>
-              <a:spcAft>
-                <a:spcPct val="0"/>
-              </a:spcAft>
-              <a:defRPr sz="2400">
-                <a:solidFill>
-                  <a:schemeClr val="tx1"/>
-                </a:solidFill>
-                <a:latin typeface="Times New Roman" panose="02020603050405020304" pitchFamily="18" charset="0"/>
-              </a:defRPr>
-            </a:lvl7pPr>
-            <a:lvl8pPr marL="3429000" indent="-228600" eaLnBrk="0" fontAlgn="base" hangingPunct="0">
-              <a:spcBef>
-                <a:spcPct val="0"/>
-              </a:spcBef>
-              <a:spcAft>
-                <a:spcPct val="0"/>
-              </a:spcAft>
-              <a:defRPr sz="2400">
-                <a:solidFill>
-                  <a:schemeClr val="tx1"/>
-                </a:solidFill>
-                <a:latin typeface="Times New Roman" panose="02020603050405020304" pitchFamily="18" charset="0"/>
-              </a:defRPr>
-            </a:lvl8pPr>
-            <a:lvl9pPr marL="3886200" indent="-228600" eaLnBrk="0" fontAlgn="base" hangingPunct="0">
-              <a:spcBef>
-                <a:spcPct val="0"/>
-              </a:spcBef>
-              <a:spcAft>
-                <a:spcPct val="0"/>
-              </a:spcAft>
-              <a:defRPr sz="2400">
-                <a:solidFill>
-                  <a:schemeClr val="tx1"/>
-                </a:solidFill>
-                <a:latin typeface="Times New Roman" panose="02020603050405020304" pitchFamily="18" charset="0"/>
-              </a:defRPr>
-            </a:lvl9pPr>
-          </a:lstStyle>
-          <a:p>
-            <a:r>
-              <a:rPr lang="en-US" altLang="en-US" dirty="0"/>
-              <a:t>There are only 2-3 columns of non-redundant information </a:t>
+          <a:lstStyle/>
+          <a:p>
+            <a:r>
+              <a:rPr lang="en-US" sz="1400" dirty="0">
+                <a:latin typeface="Arial" pitchFamily="34" charset="0"/>
+                <a:cs typeface="Arial" pitchFamily="34" charset="0"/>
+              </a:rPr>
+              <a:t>https://github.com/afodor/metagenomicsTools/blob/master/src/machineLearningExamples/pcaRotation.txt</a:t>
             </a:r>
           </a:p>
         </p:txBody>
@@ -5902,539 +5623,6 @@
 </file>
 
 <file path=ppt/slides/slide10.xml><?xml version="1.0" encoding="utf-8"?>
-<p:sld xmlns:a="http://schemas.openxmlformats.org/drawingml/2006/main" xmlns:r="http://schemas.openxmlformats.org/officeDocument/2006/relationships" xmlns:p="http://schemas.openxmlformats.org/presentationml/2006/main">
-  <p:cSld>
-    <p:spTree>
-      <p:nvGrpSpPr>
-        <p:cNvPr id="1" name=""/>
-        <p:cNvGrpSpPr/>
-        <p:nvPr/>
-      </p:nvGrpSpPr>
-      <p:grpSpPr>
-        <a:xfrm>
-          <a:off x="0" y="0"/>
-          <a:ext cx="0" cy="0"/>
-          <a:chOff x="0" y="0"/>
-          <a:chExt cx="0" cy="0"/>
-        </a:xfrm>
-      </p:grpSpPr>
-      <p:pic>
-        <p:nvPicPr>
-          <p:cNvPr id="2" name="Picture 1">
-            <a:extLst>
-              <a:ext uri="{FF2B5EF4-FFF2-40B4-BE49-F238E27FC236}">
-                <a16:creationId xmlns:a16="http://schemas.microsoft.com/office/drawing/2014/main" id="{7D977851-3764-4F96-938E-11820ED1BC1C}"/>
-              </a:ext>
-            </a:extLst>
-          </p:cNvPr>
-          <p:cNvPicPr>
-            <a:picLocks noChangeAspect="1"/>
-          </p:cNvPicPr>
-          <p:nvPr/>
-        </p:nvPicPr>
-        <p:blipFill>
-          <a:blip r:embed="rId2"/>
-          <a:stretch>
-            <a:fillRect/>
-          </a:stretch>
-        </p:blipFill>
-        <p:spPr>
-          <a:xfrm>
-            <a:off x="381000" y="1600200"/>
-            <a:ext cx="8191500" cy="723900"/>
-          </a:xfrm>
-          <a:prstGeom prst="rect">
-            <a:avLst/>
-          </a:prstGeom>
-        </p:spPr>
-      </p:pic>
-      <p:pic>
-        <p:nvPicPr>
-          <p:cNvPr id="3" name="Picture 2">
-            <a:extLst>
-              <a:ext uri="{FF2B5EF4-FFF2-40B4-BE49-F238E27FC236}">
-                <a16:creationId xmlns:a16="http://schemas.microsoft.com/office/drawing/2014/main" id="{B251601F-EA86-4C9F-862F-A779C731EF86}"/>
-              </a:ext>
-            </a:extLst>
-          </p:cNvPr>
-          <p:cNvPicPr>
-            <a:picLocks noChangeAspect="1"/>
-          </p:cNvPicPr>
-          <p:nvPr/>
-        </p:nvPicPr>
-        <p:blipFill>
-          <a:blip r:embed="rId3"/>
-          <a:stretch>
-            <a:fillRect/>
-          </a:stretch>
-        </p:blipFill>
-        <p:spPr>
-          <a:xfrm>
-            <a:off x="914400" y="2566988"/>
-            <a:ext cx="3951981" cy="3933825"/>
-          </a:xfrm>
-          <a:prstGeom prst="rect">
-            <a:avLst/>
-          </a:prstGeom>
-        </p:spPr>
-      </p:pic>
-      <p:cxnSp>
-        <p:nvCxnSpPr>
-          <p:cNvPr id="5" name="Straight Arrow Connector 4">
-            <a:extLst>
-              <a:ext uri="{FF2B5EF4-FFF2-40B4-BE49-F238E27FC236}">
-                <a16:creationId xmlns:a16="http://schemas.microsoft.com/office/drawing/2014/main" id="{10C35B1F-44DF-4D37-BBD2-678F6AFDBE4F}"/>
-              </a:ext>
-            </a:extLst>
-          </p:cNvPr>
-          <p:cNvCxnSpPr/>
-          <p:nvPr/>
-        </p:nvCxnSpPr>
-        <p:spPr>
-          <a:xfrm flipH="1">
-            <a:off x="1371600" y="1219200"/>
-            <a:ext cx="304800" cy="457200"/>
-          </a:xfrm>
-          <a:prstGeom prst="straightConnector1">
-            <a:avLst/>
-          </a:prstGeom>
-          <a:ln>
-            <a:solidFill>
-              <a:srgbClr val="FF0000"/>
-            </a:solidFill>
-            <a:tailEnd type="triangle"/>
-          </a:ln>
-        </p:spPr>
-        <p:style>
-          <a:lnRef idx="1">
-            <a:schemeClr val="accent1"/>
-          </a:lnRef>
-          <a:fillRef idx="0">
-            <a:schemeClr val="accent1"/>
-          </a:fillRef>
-          <a:effectRef idx="0">
-            <a:schemeClr val="accent1"/>
-          </a:effectRef>
-          <a:fontRef idx="minor">
-            <a:schemeClr val="tx1"/>
-          </a:fontRef>
-        </p:style>
-      </p:cxnSp>
-      <p:sp>
-        <p:nvSpPr>
-          <p:cNvPr id="6" name="TextBox 5">
-            <a:extLst>
-              <a:ext uri="{FF2B5EF4-FFF2-40B4-BE49-F238E27FC236}">
-                <a16:creationId xmlns:a16="http://schemas.microsoft.com/office/drawing/2014/main" id="{855FF372-F0DF-4017-B31B-E65FC0883860}"/>
-              </a:ext>
-            </a:extLst>
-          </p:cNvPr>
-          <p:cNvSpPr txBox="1"/>
-          <p:nvPr/>
-        </p:nvSpPr>
-        <p:spPr>
-          <a:xfrm>
-            <a:off x="1524000" y="914400"/>
-            <a:ext cx="6436442" cy="646331"/>
-          </a:xfrm>
-          <a:prstGeom prst="rect">
-            <a:avLst/>
-          </a:prstGeom>
-          <a:noFill/>
-        </p:spPr>
-        <p:txBody>
-          <a:bodyPr wrap="none" rtlCol="0">
-            <a:spAutoFit/>
-          </a:bodyPr>
-          <a:lstStyle/>
-          <a:p>
-            <a:r>
-              <a:rPr lang="en-US" sz="1800" dirty="0"/>
-              <a:t>When you have more taxa than samples, you need to use </a:t>
-            </a:r>
-            <a:r>
-              <a:rPr lang="en-US" sz="1800" dirty="0" err="1"/>
-              <a:t>prcomp</a:t>
-            </a:r>
-            <a:endParaRPr lang="en-US" sz="1800" dirty="0"/>
-          </a:p>
-          <a:p>
-            <a:r>
-              <a:rPr lang="en-US" sz="1800" dirty="0"/>
-              <a:t>(and the PCA axes are identified by “rotation” in the return object”)</a:t>
-            </a:r>
-          </a:p>
-        </p:txBody>
-      </p:sp>
-      <p:pic>
-        <p:nvPicPr>
-          <p:cNvPr id="7" name="Picture 6">
-            <a:extLst>
-              <a:ext uri="{FF2B5EF4-FFF2-40B4-BE49-F238E27FC236}">
-                <a16:creationId xmlns:a16="http://schemas.microsoft.com/office/drawing/2014/main" id="{32B63305-71B4-47DA-8E74-1034D01468FB}"/>
-              </a:ext>
-            </a:extLst>
-          </p:cNvPr>
-          <p:cNvPicPr>
-            <a:picLocks noChangeAspect="1"/>
-          </p:cNvPicPr>
-          <p:nvPr/>
-        </p:nvPicPr>
-        <p:blipFill>
-          <a:blip r:embed="rId4"/>
-          <a:stretch>
-            <a:fillRect/>
-          </a:stretch>
-        </p:blipFill>
-        <p:spPr>
-          <a:xfrm>
-            <a:off x="5057775" y="3200400"/>
-            <a:ext cx="3514725" cy="1200150"/>
-          </a:xfrm>
-          <a:prstGeom prst="rect">
-            <a:avLst/>
-          </a:prstGeom>
-        </p:spPr>
-      </p:pic>
-      <p:cxnSp>
-        <p:nvCxnSpPr>
-          <p:cNvPr id="9" name="Straight Arrow Connector 8">
-            <a:extLst>
-              <a:ext uri="{FF2B5EF4-FFF2-40B4-BE49-F238E27FC236}">
-                <a16:creationId xmlns:a16="http://schemas.microsoft.com/office/drawing/2014/main" id="{31B66B5E-F319-4204-8A62-8E1E4E0469E1}"/>
-              </a:ext>
-            </a:extLst>
-          </p:cNvPr>
-          <p:cNvCxnSpPr/>
-          <p:nvPr/>
-        </p:nvCxnSpPr>
-        <p:spPr>
-          <a:xfrm flipH="1">
-            <a:off x="4742221" y="5334000"/>
-            <a:ext cx="591779" cy="381000"/>
-          </a:xfrm>
-          <a:prstGeom prst="straightConnector1">
-            <a:avLst/>
-          </a:prstGeom>
-          <a:ln>
-            <a:tailEnd type="triangle"/>
-          </a:ln>
-        </p:spPr>
-        <p:style>
-          <a:lnRef idx="1">
-            <a:schemeClr val="accent1"/>
-          </a:lnRef>
-          <a:fillRef idx="0">
-            <a:schemeClr val="accent1"/>
-          </a:fillRef>
-          <a:effectRef idx="0">
-            <a:schemeClr val="accent1"/>
-          </a:effectRef>
-          <a:fontRef idx="minor">
-            <a:schemeClr val="tx1"/>
-          </a:fontRef>
-        </p:style>
-      </p:cxnSp>
-      <p:sp>
-        <p:nvSpPr>
-          <p:cNvPr id="10" name="TextBox 9">
-            <a:extLst>
-              <a:ext uri="{FF2B5EF4-FFF2-40B4-BE49-F238E27FC236}">
-                <a16:creationId xmlns:a16="http://schemas.microsoft.com/office/drawing/2014/main" id="{6B9E4845-562D-4E52-B215-9809EE43E0F5}"/>
-              </a:ext>
-            </a:extLst>
-          </p:cNvPr>
-          <p:cNvSpPr txBox="1"/>
-          <p:nvPr/>
-        </p:nvSpPr>
-        <p:spPr>
-          <a:xfrm>
-            <a:off x="5334000" y="4953000"/>
-            <a:ext cx="3464410" cy="830997"/>
-          </a:xfrm>
-          <a:prstGeom prst="rect">
-            <a:avLst/>
-          </a:prstGeom>
-          <a:noFill/>
-        </p:spPr>
-        <p:txBody>
-          <a:bodyPr wrap="none" rtlCol="0">
-            <a:spAutoFit/>
-          </a:bodyPr>
-          <a:lstStyle/>
-          <a:p>
-            <a:r>
-              <a:rPr lang="en-US" dirty="0"/>
-              <a:t>Our first axis is dominated</a:t>
-            </a:r>
-          </a:p>
-          <a:p>
-            <a:r>
-              <a:rPr lang="en-US" dirty="0"/>
-              <a:t>by a single outlier</a:t>
-            </a:r>
-          </a:p>
-        </p:txBody>
-      </p:sp>
-    </p:spTree>
-    <p:extLst>
-      <p:ext uri="{BB962C8B-B14F-4D97-AF65-F5344CB8AC3E}">
-        <p14:creationId xmlns:p14="http://schemas.microsoft.com/office/powerpoint/2010/main" val="3634307174"/>
-      </p:ext>
-    </p:extLst>
-  </p:cSld>
-  <p:clrMapOvr>
-    <a:masterClrMapping/>
-  </p:clrMapOvr>
-</p:sld>
-</file>
-
-<file path=ppt/slides/slide11.xml><?xml version="1.0" encoding="utf-8"?>
-<p:sld xmlns:a="http://schemas.openxmlformats.org/drawingml/2006/main" xmlns:r="http://schemas.openxmlformats.org/officeDocument/2006/relationships" xmlns:p="http://schemas.openxmlformats.org/presentationml/2006/main">
-  <p:cSld>
-    <p:spTree>
-      <p:nvGrpSpPr>
-        <p:cNvPr id="1" name=""/>
-        <p:cNvGrpSpPr/>
-        <p:nvPr/>
-      </p:nvGrpSpPr>
-      <p:grpSpPr>
-        <a:xfrm>
-          <a:off x="0" y="0"/>
-          <a:ext cx="0" cy="0"/>
-          <a:chOff x="0" y="0"/>
-          <a:chExt cx="0" cy="0"/>
-        </a:xfrm>
-      </p:grpSpPr>
-      <p:sp>
-        <p:nvSpPr>
-          <p:cNvPr id="2" name="TextBox 1">
-            <a:extLst>
-              <a:ext uri="{FF2B5EF4-FFF2-40B4-BE49-F238E27FC236}">
-                <a16:creationId xmlns:a16="http://schemas.microsoft.com/office/drawing/2014/main" id="{2EE7642E-022C-4FFB-8FBE-7AC76D03FFBB}"/>
-              </a:ext>
-            </a:extLst>
-          </p:cNvPr>
-          <p:cNvSpPr txBox="1"/>
-          <p:nvPr/>
-        </p:nvSpPr>
-        <p:spPr>
-          <a:xfrm>
-            <a:off x="457200" y="457200"/>
-            <a:ext cx="6158289" cy="461665"/>
-          </a:xfrm>
-          <a:prstGeom prst="rect">
-            <a:avLst/>
-          </a:prstGeom>
-          <a:noFill/>
-        </p:spPr>
-        <p:txBody>
-          <a:bodyPr wrap="none" rtlCol="0">
-            <a:spAutoFit/>
-          </a:bodyPr>
-          <a:lstStyle/>
-          <a:p>
-            <a:r>
-              <a:rPr lang="en-US" dirty="0"/>
-              <a:t>Often in ecology, we use other distance matrixes</a:t>
-            </a:r>
-          </a:p>
-        </p:txBody>
-      </p:sp>
-      <p:pic>
-        <p:nvPicPr>
-          <p:cNvPr id="3" name="Picture 2">
-            <a:extLst>
-              <a:ext uri="{FF2B5EF4-FFF2-40B4-BE49-F238E27FC236}">
-                <a16:creationId xmlns:a16="http://schemas.microsoft.com/office/drawing/2014/main" id="{DE352FC3-AE28-4E4D-A199-AD72FB0E5932}"/>
-              </a:ext>
-            </a:extLst>
-          </p:cNvPr>
-          <p:cNvPicPr>
-            <a:picLocks noChangeAspect="1"/>
-          </p:cNvPicPr>
-          <p:nvPr/>
-        </p:nvPicPr>
-        <p:blipFill>
-          <a:blip r:embed="rId2"/>
-          <a:stretch>
-            <a:fillRect/>
-          </a:stretch>
-        </p:blipFill>
-        <p:spPr>
-          <a:xfrm>
-            <a:off x="228600" y="1143000"/>
-            <a:ext cx="7981950" cy="1085850"/>
-          </a:xfrm>
-          <a:prstGeom prst="rect">
-            <a:avLst/>
-          </a:prstGeom>
-        </p:spPr>
-      </p:pic>
-      <p:pic>
-        <p:nvPicPr>
-          <p:cNvPr id="4" name="Picture 3">
-            <a:extLst>
-              <a:ext uri="{FF2B5EF4-FFF2-40B4-BE49-F238E27FC236}">
-                <a16:creationId xmlns:a16="http://schemas.microsoft.com/office/drawing/2014/main" id="{6E2860F7-D0A9-416E-8880-5833FD94E59C}"/>
-              </a:ext>
-            </a:extLst>
-          </p:cNvPr>
-          <p:cNvPicPr>
-            <a:picLocks noChangeAspect="1"/>
-          </p:cNvPicPr>
-          <p:nvPr/>
-        </p:nvPicPr>
-        <p:blipFill>
-          <a:blip r:embed="rId3"/>
-          <a:stretch>
-            <a:fillRect/>
-          </a:stretch>
-        </p:blipFill>
-        <p:spPr>
-          <a:xfrm>
-            <a:off x="220980" y="2452985"/>
-            <a:ext cx="4295775" cy="4096281"/>
-          </a:xfrm>
-          <a:prstGeom prst="rect">
-            <a:avLst/>
-          </a:prstGeom>
-        </p:spPr>
-      </p:pic>
-      <p:pic>
-        <p:nvPicPr>
-          <p:cNvPr id="5" name="Picture 4">
-            <a:extLst>
-              <a:ext uri="{FF2B5EF4-FFF2-40B4-BE49-F238E27FC236}">
-                <a16:creationId xmlns:a16="http://schemas.microsoft.com/office/drawing/2014/main" id="{8157211C-1036-4ACE-ABA2-844D50ED9E37}"/>
-              </a:ext>
-            </a:extLst>
-          </p:cNvPr>
-          <p:cNvPicPr>
-            <a:picLocks noChangeAspect="1"/>
-          </p:cNvPicPr>
-          <p:nvPr/>
-        </p:nvPicPr>
-        <p:blipFill>
-          <a:blip r:embed="rId4"/>
-          <a:stretch>
-            <a:fillRect/>
-          </a:stretch>
-        </p:blipFill>
-        <p:spPr>
-          <a:xfrm>
-            <a:off x="4627244" y="2452985"/>
-            <a:ext cx="4295776" cy="756489"/>
-          </a:xfrm>
-          <a:prstGeom prst="rect">
-            <a:avLst/>
-          </a:prstGeom>
-        </p:spPr>
-      </p:pic>
-      <p:pic>
-        <p:nvPicPr>
-          <p:cNvPr id="6" name="Picture 5">
-            <a:extLst>
-              <a:ext uri="{FF2B5EF4-FFF2-40B4-BE49-F238E27FC236}">
-                <a16:creationId xmlns:a16="http://schemas.microsoft.com/office/drawing/2014/main" id="{0C8930C0-F43F-4444-89CE-5C335AD2FA7D}"/>
-              </a:ext>
-            </a:extLst>
-          </p:cNvPr>
-          <p:cNvPicPr>
-            <a:picLocks noChangeAspect="1"/>
-          </p:cNvPicPr>
-          <p:nvPr/>
-        </p:nvPicPr>
-        <p:blipFill>
-          <a:blip r:embed="rId5"/>
-          <a:stretch>
-            <a:fillRect/>
-          </a:stretch>
-        </p:blipFill>
-        <p:spPr>
-          <a:xfrm>
-            <a:off x="4583430" y="3575295"/>
-            <a:ext cx="4343400" cy="971550"/>
-          </a:xfrm>
-          <a:prstGeom prst="rect">
-            <a:avLst/>
-          </a:prstGeom>
-        </p:spPr>
-      </p:pic>
-    </p:spTree>
-    <p:extLst>
-      <p:ext uri="{BB962C8B-B14F-4D97-AF65-F5344CB8AC3E}">
-        <p14:creationId xmlns:p14="http://schemas.microsoft.com/office/powerpoint/2010/main" val="1738934978"/>
-      </p:ext>
-    </p:extLst>
-  </p:cSld>
-  <p:clrMapOvr>
-    <a:masterClrMapping/>
-  </p:clrMapOvr>
-</p:sld>
-</file>
-
-<file path=ppt/slides/slide12.xml><?xml version="1.0" encoding="utf-8"?>
-<p:sld xmlns:a="http://schemas.openxmlformats.org/drawingml/2006/main" xmlns:r="http://schemas.openxmlformats.org/officeDocument/2006/relationships" xmlns:p="http://schemas.openxmlformats.org/presentationml/2006/main">
-  <p:cSld>
-    <p:spTree>
-      <p:nvGrpSpPr>
-        <p:cNvPr id="1" name=""/>
-        <p:cNvGrpSpPr/>
-        <p:nvPr/>
-      </p:nvGrpSpPr>
-      <p:grpSpPr>
-        <a:xfrm>
-          <a:off x="0" y="0"/>
-          <a:ext cx="0" cy="0"/>
-          <a:chOff x="0" y="0"/>
-          <a:chExt cx="0" cy="0"/>
-        </a:xfrm>
-      </p:grpSpPr>
-      <p:pic>
-        <p:nvPicPr>
-          <p:cNvPr id="2" name="Picture 1">
-            <a:extLst>
-              <a:ext uri="{FF2B5EF4-FFF2-40B4-BE49-F238E27FC236}">
-                <a16:creationId xmlns:a16="http://schemas.microsoft.com/office/drawing/2014/main" id="{E39542B4-AA05-4E46-9923-F4F808E92B11}"/>
-              </a:ext>
-            </a:extLst>
-          </p:cNvPr>
-          <p:cNvPicPr>
-            <a:picLocks noChangeAspect="1"/>
-          </p:cNvPicPr>
-          <p:nvPr/>
-        </p:nvPicPr>
-        <p:blipFill>
-          <a:blip r:embed="rId2"/>
-          <a:stretch>
-            <a:fillRect/>
-          </a:stretch>
-        </p:blipFill>
-        <p:spPr>
-          <a:xfrm>
-            <a:off x="381000" y="1752600"/>
-            <a:ext cx="7726560" cy="2799585"/>
-          </a:xfrm>
-          <a:prstGeom prst="rect">
-            <a:avLst/>
-          </a:prstGeom>
-        </p:spPr>
-      </p:pic>
-    </p:spTree>
-    <p:extLst>
-      <p:ext uri="{BB962C8B-B14F-4D97-AF65-F5344CB8AC3E}">
-        <p14:creationId xmlns:p14="http://schemas.microsoft.com/office/powerpoint/2010/main" val="3999768120"/>
-      </p:ext>
-    </p:extLst>
-  </p:cSld>
-  <p:clrMapOvr>
-    <a:masterClrMapping/>
-  </p:clrMapOvr>
-</p:sld>
-</file>
-
-<file path=ppt/slides/slide2.xml><?xml version="1.0" encoding="utf-8"?>
 <p:sld xmlns:a="http://schemas.openxmlformats.org/drawingml/2006/main" xmlns:r="http://schemas.openxmlformats.org/officeDocument/2006/relationships" xmlns:p="http://schemas.openxmlformats.org/presentationml/2006/main">
   <p:cSld>
     <p:spTree>
@@ -7260,7 +6448,7 @@
 </p:sld>
 </file>
 
-<file path=ppt/slides/slide3.xml><?xml version="1.0" encoding="utf-8"?>
+<file path=ppt/slides/slide11.xml><?xml version="1.0" encoding="utf-8"?>
 <p:sld xmlns:a="http://schemas.openxmlformats.org/drawingml/2006/main" xmlns:r="http://schemas.openxmlformats.org/officeDocument/2006/relationships" xmlns:p="http://schemas.openxmlformats.org/presentationml/2006/main">
   <p:cSld>
     <p:spTree>
@@ -7405,7 +6593,7 @@
 </p:sld>
 </file>
 
-<file path=ppt/slides/slide4.xml><?xml version="1.0" encoding="utf-8"?>
+<file path=ppt/slides/slide12.xml><?xml version="1.0" encoding="utf-8"?>
 <p:sld xmlns:a="http://schemas.openxmlformats.org/drawingml/2006/main" xmlns:r="http://schemas.openxmlformats.org/officeDocument/2006/relationships" xmlns:p="http://schemas.openxmlformats.org/presentationml/2006/main">
   <p:cSld>
     <p:spTree>
@@ -8352,7 +7540,7 @@
 </p:sld>
 </file>
 
-<file path=ppt/slides/slide5.xml><?xml version="1.0" encoding="utf-8"?>
+<file path=ppt/slides/slide13.xml><?xml version="1.0" encoding="utf-8"?>
 <p:sld xmlns:a="http://schemas.openxmlformats.org/drawingml/2006/main" xmlns:r="http://schemas.openxmlformats.org/officeDocument/2006/relationships" xmlns:p="http://schemas.openxmlformats.org/presentationml/2006/main">
   <p:cSld>
     <p:spTree>
@@ -8692,7 +7880,7 @@
 </p:sld>
 </file>
 
-<file path=ppt/slides/slide6.xml><?xml version="1.0" encoding="utf-8"?>
+<file path=ppt/slides/slide14.xml><?xml version="1.0" encoding="utf-8"?>
 <p:sld xmlns:a="http://schemas.openxmlformats.org/drawingml/2006/main" xmlns:r="http://schemas.openxmlformats.org/officeDocument/2006/relationships" xmlns:p="http://schemas.openxmlformats.org/presentationml/2006/main">
   <p:cSld>
     <p:spTree>
@@ -8787,7 +7975,7 @@
 </p:sld>
 </file>
 
-<file path=ppt/slides/slide7.xml><?xml version="1.0" encoding="utf-8"?>
+<file path=ppt/slides/slide15.xml><?xml version="1.0" encoding="utf-8"?>
 <p:sld xmlns:a="http://schemas.openxmlformats.org/drawingml/2006/main" xmlns:r="http://schemas.openxmlformats.org/officeDocument/2006/relationships" xmlns:p="http://schemas.openxmlformats.org/presentationml/2006/main">
   <p:cSld>
     <p:spTree>
@@ -8886,7 +8074,7 @@
 </p:sld>
 </file>
 
-<file path=ppt/slides/slide8.xml><?xml version="1.0" encoding="utf-8"?>
+<file path=ppt/slides/slide16.xml><?xml version="1.0" encoding="utf-8"?>
 <p:sld xmlns:a="http://schemas.openxmlformats.org/drawingml/2006/main" xmlns:r="http://schemas.openxmlformats.org/officeDocument/2006/relationships" xmlns:p="http://schemas.openxmlformats.org/presentationml/2006/main">
   <p:cSld>
     <p:spTree>
@@ -9024,7 +8212,7 @@
 </p:sld>
 </file>
 
-<file path=ppt/slides/slide9.xml><?xml version="1.0" encoding="utf-8"?>
+<file path=ppt/slides/slide17.xml><?xml version="1.0" encoding="utf-8"?>
 <p:sld xmlns:a="http://schemas.openxmlformats.org/drawingml/2006/main" xmlns:r="http://schemas.openxmlformats.org/officeDocument/2006/relationships" xmlns:p="http://schemas.openxmlformats.org/presentationml/2006/main">
   <p:cSld>
     <p:spTree>
@@ -9193,6 +8381,2209 @@
         <p14:creationId xmlns:p14="http://schemas.microsoft.com/office/powerpoint/2010/main" val="919952892"/>
       </p:ext>
     </p:extLst>
+  </p:cSld>
+  <p:clrMapOvr>
+    <a:masterClrMapping/>
+  </p:clrMapOvr>
+</p:sld>
+</file>
+
+<file path=ppt/slides/slide18.xml><?xml version="1.0" encoding="utf-8"?>
+<p:sld xmlns:a="http://schemas.openxmlformats.org/drawingml/2006/main" xmlns:r="http://schemas.openxmlformats.org/officeDocument/2006/relationships" xmlns:p="http://schemas.openxmlformats.org/presentationml/2006/main">
+  <p:cSld>
+    <p:spTree>
+      <p:nvGrpSpPr>
+        <p:cNvPr id="1" name=""/>
+        <p:cNvGrpSpPr/>
+        <p:nvPr/>
+      </p:nvGrpSpPr>
+      <p:grpSpPr>
+        <a:xfrm>
+          <a:off x="0" y="0"/>
+          <a:ext cx="0" cy="0"/>
+          <a:chOff x="0" y="0"/>
+          <a:chExt cx="0" cy="0"/>
+        </a:xfrm>
+      </p:grpSpPr>
+      <p:pic>
+        <p:nvPicPr>
+          <p:cNvPr id="2" name="Picture 1">
+            <a:extLst>
+              <a:ext uri="{FF2B5EF4-FFF2-40B4-BE49-F238E27FC236}">
+                <a16:creationId xmlns:a16="http://schemas.microsoft.com/office/drawing/2014/main" id="{7D977851-3764-4F96-938E-11820ED1BC1C}"/>
+              </a:ext>
+            </a:extLst>
+          </p:cNvPr>
+          <p:cNvPicPr>
+            <a:picLocks noChangeAspect="1"/>
+          </p:cNvPicPr>
+          <p:nvPr/>
+        </p:nvPicPr>
+        <p:blipFill>
+          <a:blip r:embed="rId2"/>
+          <a:stretch>
+            <a:fillRect/>
+          </a:stretch>
+        </p:blipFill>
+        <p:spPr>
+          <a:xfrm>
+            <a:off x="381000" y="1600200"/>
+            <a:ext cx="8191500" cy="723900"/>
+          </a:xfrm>
+          <a:prstGeom prst="rect">
+            <a:avLst/>
+          </a:prstGeom>
+        </p:spPr>
+      </p:pic>
+      <p:pic>
+        <p:nvPicPr>
+          <p:cNvPr id="3" name="Picture 2">
+            <a:extLst>
+              <a:ext uri="{FF2B5EF4-FFF2-40B4-BE49-F238E27FC236}">
+                <a16:creationId xmlns:a16="http://schemas.microsoft.com/office/drawing/2014/main" id="{B251601F-EA86-4C9F-862F-A779C731EF86}"/>
+              </a:ext>
+            </a:extLst>
+          </p:cNvPr>
+          <p:cNvPicPr>
+            <a:picLocks noChangeAspect="1"/>
+          </p:cNvPicPr>
+          <p:nvPr/>
+        </p:nvPicPr>
+        <p:blipFill>
+          <a:blip r:embed="rId3"/>
+          <a:stretch>
+            <a:fillRect/>
+          </a:stretch>
+        </p:blipFill>
+        <p:spPr>
+          <a:xfrm>
+            <a:off x="914400" y="2566988"/>
+            <a:ext cx="3951981" cy="3933825"/>
+          </a:xfrm>
+          <a:prstGeom prst="rect">
+            <a:avLst/>
+          </a:prstGeom>
+        </p:spPr>
+      </p:pic>
+      <p:cxnSp>
+        <p:nvCxnSpPr>
+          <p:cNvPr id="5" name="Straight Arrow Connector 4">
+            <a:extLst>
+              <a:ext uri="{FF2B5EF4-FFF2-40B4-BE49-F238E27FC236}">
+                <a16:creationId xmlns:a16="http://schemas.microsoft.com/office/drawing/2014/main" id="{10C35B1F-44DF-4D37-BBD2-678F6AFDBE4F}"/>
+              </a:ext>
+            </a:extLst>
+          </p:cNvPr>
+          <p:cNvCxnSpPr/>
+          <p:nvPr/>
+        </p:nvCxnSpPr>
+        <p:spPr>
+          <a:xfrm flipH="1">
+            <a:off x="1371600" y="1219200"/>
+            <a:ext cx="304800" cy="457200"/>
+          </a:xfrm>
+          <a:prstGeom prst="straightConnector1">
+            <a:avLst/>
+          </a:prstGeom>
+          <a:ln>
+            <a:solidFill>
+              <a:srgbClr val="FF0000"/>
+            </a:solidFill>
+            <a:tailEnd type="triangle"/>
+          </a:ln>
+        </p:spPr>
+        <p:style>
+          <a:lnRef idx="1">
+            <a:schemeClr val="accent1"/>
+          </a:lnRef>
+          <a:fillRef idx="0">
+            <a:schemeClr val="accent1"/>
+          </a:fillRef>
+          <a:effectRef idx="0">
+            <a:schemeClr val="accent1"/>
+          </a:effectRef>
+          <a:fontRef idx="minor">
+            <a:schemeClr val="tx1"/>
+          </a:fontRef>
+        </p:style>
+      </p:cxnSp>
+      <p:sp>
+        <p:nvSpPr>
+          <p:cNvPr id="6" name="TextBox 5">
+            <a:extLst>
+              <a:ext uri="{FF2B5EF4-FFF2-40B4-BE49-F238E27FC236}">
+                <a16:creationId xmlns:a16="http://schemas.microsoft.com/office/drawing/2014/main" id="{855FF372-F0DF-4017-B31B-E65FC0883860}"/>
+              </a:ext>
+            </a:extLst>
+          </p:cNvPr>
+          <p:cNvSpPr txBox="1"/>
+          <p:nvPr/>
+        </p:nvSpPr>
+        <p:spPr>
+          <a:xfrm>
+            <a:off x="1524000" y="914400"/>
+            <a:ext cx="6436442" cy="646331"/>
+          </a:xfrm>
+          <a:prstGeom prst="rect">
+            <a:avLst/>
+          </a:prstGeom>
+          <a:noFill/>
+        </p:spPr>
+        <p:txBody>
+          <a:bodyPr wrap="none" rtlCol="0">
+            <a:spAutoFit/>
+          </a:bodyPr>
+          <a:lstStyle/>
+          <a:p>
+            <a:r>
+              <a:rPr lang="en-US" sz="1800" dirty="0"/>
+              <a:t>When you have more taxa than samples, you need to use </a:t>
+            </a:r>
+            <a:r>
+              <a:rPr lang="en-US" sz="1800" dirty="0" err="1"/>
+              <a:t>prcomp</a:t>
+            </a:r>
+            <a:endParaRPr lang="en-US" sz="1800" dirty="0"/>
+          </a:p>
+          <a:p>
+            <a:r>
+              <a:rPr lang="en-US" sz="1800" dirty="0"/>
+              <a:t>(and the PCA axes are identified by “rotation” in the return object”)</a:t>
+            </a:r>
+          </a:p>
+        </p:txBody>
+      </p:sp>
+      <p:pic>
+        <p:nvPicPr>
+          <p:cNvPr id="7" name="Picture 6">
+            <a:extLst>
+              <a:ext uri="{FF2B5EF4-FFF2-40B4-BE49-F238E27FC236}">
+                <a16:creationId xmlns:a16="http://schemas.microsoft.com/office/drawing/2014/main" id="{32B63305-71B4-47DA-8E74-1034D01468FB}"/>
+              </a:ext>
+            </a:extLst>
+          </p:cNvPr>
+          <p:cNvPicPr>
+            <a:picLocks noChangeAspect="1"/>
+          </p:cNvPicPr>
+          <p:nvPr/>
+        </p:nvPicPr>
+        <p:blipFill>
+          <a:blip r:embed="rId4"/>
+          <a:stretch>
+            <a:fillRect/>
+          </a:stretch>
+        </p:blipFill>
+        <p:spPr>
+          <a:xfrm>
+            <a:off x="5057775" y="3200400"/>
+            <a:ext cx="3514725" cy="1200150"/>
+          </a:xfrm>
+          <a:prstGeom prst="rect">
+            <a:avLst/>
+          </a:prstGeom>
+        </p:spPr>
+      </p:pic>
+      <p:cxnSp>
+        <p:nvCxnSpPr>
+          <p:cNvPr id="9" name="Straight Arrow Connector 8">
+            <a:extLst>
+              <a:ext uri="{FF2B5EF4-FFF2-40B4-BE49-F238E27FC236}">
+                <a16:creationId xmlns:a16="http://schemas.microsoft.com/office/drawing/2014/main" id="{31B66B5E-F319-4204-8A62-8E1E4E0469E1}"/>
+              </a:ext>
+            </a:extLst>
+          </p:cNvPr>
+          <p:cNvCxnSpPr/>
+          <p:nvPr/>
+        </p:nvCxnSpPr>
+        <p:spPr>
+          <a:xfrm flipH="1">
+            <a:off x="4742221" y="5334000"/>
+            <a:ext cx="591779" cy="381000"/>
+          </a:xfrm>
+          <a:prstGeom prst="straightConnector1">
+            <a:avLst/>
+          </a:prstGeom>
+          <a:ln>
+            <a:tailEnd type="triangle"/>
+          </a:ln>
+        </p:spPr>
+        <p:style>
+          <a:lnRef idx="1">
+            <a:schemeClr val="accent1"/>
+          </a:lnRef>
+          <a:fillRef idx="0">
+            <a:schemeClr val="accent1"/>
+          </a:fillRef>
+          <a:effectRef idx="0">
+            <a:schemeClr val="accent1"/>
+          </a:effectRef>
+          <a:fontRef idx="minor">
+            <a:schemeClr val="tx1"/>
+          </a:fontRef>
+        </p:style>
+      </p:cxnSp>
+      <p:sp>
+        <p:nvSpPr>
+          <p:cNvPr id="10" name="TextBox 9">
+            <a:extLst>
+              <a:ext uri="{FF2B5EF4-FFF2-40B4-BE49-F238E27FC236}">
+                <a16:creationId xmlns:a16="http://schemas.microsoft.com/office/drawing/2014/main" id="{6B9E4845-562D-4E52-B215-9809EE43E0F5}"/>
+              </a:ext>
+            </a:extLst>
+          </p:cNvPr>
+          <p:cNvSpPr txBox="1"/>
+          <p:nvPr/>
+        </p:nvSpPr>
+        <p:spPr>
+          <a:xfrm>
+            <a:off x="5334000" y="4953000"/>
+            <a:ext cx="3464410" cy="830997"/>
+          </a:xfrm>
+          <a:prstGeom prst="rect">
+            <a:avLst/>
+          </a:prstGeom>
+          <a:noFill/>
+        </p:spPr>
+        <p:txBody>
+          <a:bodyPr wrap="none" rtlCol="0">
+            <a:spAutoFit/>
+          </a:bodyPr>
+          <a:lstStyle/>
+          <a:p>
+            <a:r>
+              <a:rPr lang="en-US" dirty="0"/>
+              <a:t>Our first axis is dominated</a:t>
+            </a:r>
+          </a:p>
+          <a:p>
+            <a:r>
+              <a:rPr lang="en-US" dirty="0"/>
+              <a:t>by a single outlier</a:t>
+            </a:r>
+          </a:p>
+        </p:txBody>
+      </p:sp>
+    </p:spTree>
+    <p:extLst>
+      <p:ext uri="{BB962C8B-B14F-4D97-AF65-F5344CB8AC3E}">
+        <p14:creationId xmlns:p14="http://schemas.microsoft.com/office/powerpoint/2010/main" val="3634307174"/>
+      </p:ext>
+    </p:extLst>
+  </p:cSld>
+  <p:clrMapOvr>
+    <a:masterClrMapping/>
+  </p:clrMapOvr>
+</p:sld>
+</file>
+
+<file path=ppt/slides/slide19.xml><?xml version="1.0" encoding="utf-8"?>
+<p:sld xmlns:a="http://schemas.openxmlformats.org/drawingml/2006/main" xmlns:r="http://schemas.openxmlformats.org/officeDocument/2006/relationships" xmlns:p="http://schemas.openxmlformats.org/presentationml/2006/main">
+  <p:cSld>
+    <p:spTree>
+      <p:nvGrpSpPr>
+        <p:cNvPr id="1" name=""/>
+        <p:cNvGrpSpPr/>
+        <p:nvPr/>
+      </p:nvGrpSpPr>
+      <p:grpSpPr>
+        <a:xfrm>
+          <a:off x="0" y="0"/>
+          <a:ext cx="0" cy="0"/>
+          <a:chOff x="0" y="0"/>
+          <a:chExt cx="0" cy="0"/>
+        </a:xfrm>
+      </p:grpSpPr>
+      <p:sp>
+        <p:nvSpPr>
+          <p:cNvPr id="2" name="TextBox 1">
+            <a:extLst>
+              <a:ext uri="{FF2B5EF4-FFF2-40B4-BE49-F238E27FC236}">
+                <a16:creationId xmlns:a16="http://schemas.microsoft.com/office/drawing/2014/main" id="{2EE7642E-022C-4FFB-8FBE-7AC76D03FFBB}"/>
+              </a:ext>
+            </a:extLst>
+          </p:cNvPr>
+          <p:cNvSpPr txBox="1"/>
+          <p:nvPr/>
+        </p:nvSpPr>
+        <p:spPr>
+          <a:xfrm>
+            <a:off x="457200" y="457200"/>
+            <a:ext cx="6158289" cy="461665"/>
+          </a:xfrm>
+          <a:prstGeom prst="rect">
+            <a:avLst/>
+          </a:prstGeom>
+          <a:noFill/>
+        </p:spPr>
+        <p:txBody>
+          <a:bodyPr wrap="none" rtlCol="0">
+            <a:spAutoFit/>
+          </a:bodyPr>
+          <a:lstStyle/>
+          <a:p>
+            <a:r>
+              <a:rPr lang="en-US" dirty="0"/>
+              <a:t>Often in ecology, we use other distance matrixes</a:t>
+            </a:r>
+          </a:p>
+        </p:txBody>
+      </p:sp>
+      <p:pic>
+        <p:nvPicPr>
+          <p:cNvPr id="3" name="Picture 2">
+            <a:extLst>
+              <a:ext uri="{FF2B5EF4-FFF2-40B4-BE49-F238E27FC236}">
+                <a16:creationId xmlns:a16="http://schemas.microsoft.com/office/drawing/2014/main" id="{DE352FC3-AE28-4E4D-A199-AD72FB0E5932}"/>
+              </a:ext>
+            </a:extLst>
+          </p:cNvPr>
+          <p:cNvPicPr>
+            <a:picLocks noChangeAspect="1"/>
+          </p:cNvPicPr>
+          <p:nvPr/>
+        </p:nvPicPr>
+        <p:blipFill>
+          <a:blip r:embed="rId2"/>
+          <a:stretch>
+            <a:fillRect/>
+          </a:stretch>
+        </p:blipFill>
+        <p:spPr>
+          <a:xfrm>
+            <a:off x="228600" y="1143000"/>
+            <a:ext cx="7981950" cy="1085850"/>
+          </a:xfrm>
+          <a:prstGeom prst="rect">
+            <a:avLst/>
+          </a:prstGeom>
+        </p:spPr>
+      </p:pic>
+      <p:pic>
+        <p:nvPicPr>
+          <p:cNvPr id="4" name="Picture 3">
+            <a:extLst>
+              <a:ext uri="{FF2B5EF4-FFF2-40B4-BE49-F238E27FC236}">
+                <a16:creationId xmlns:a16="http://schemas.microsoft.com/office/drawing/2014/main" id="{6E2860F7-D0A9-416E-8880-5833FD94E59C}"/>
+              </a:ext>
+            </a:extLst>
+          </p:cNvPr>
+          <p:cNvPicPr>
+            <a:picLocks noChangeAspect="1"/>
+          </p:cNvPicPr>
+          <p:nvPr/>
+        </p:nvPicPr>
+        <p:blipFill>
+          <a:blip r:embed="rId3"/>
+          <a:stretch>
+            <a:fillRect/>
+          </a:stretch>
+        </p:blipFill>
+        <p:spPr>
+          <a:xfrm>
+            <a:off x="220980" y="2452985"/>
+            <a:ext cx="4295775" cy="4096281"/>
+          </a:xfrm>
+          <a:prstGeom prst="rect">
+            <a:avLst/>
+          </a:prstGeom>
+        </p:spPr>
+      </p:pic>
+      <p:pic>
+        <p:nvPicPr>
+          <p:cNvPr id="5" name="Picture 4">
+            <a:extLst>
+              <a:ext uri="{FF2B5EF4-FFF2-40B4-BE49-F238E27FC236}">
+                <a16:creationId xmlns:a16="http://schemas.microsoft.com/office/drawing/2014/main" id="{8157211C-1036-4ACE-ABA2-844D50ED9E37}"/>
+              </a:ext>
+            </a:extLst>
+          </p:cNvPr>
+          <p:cNvPicPr>
+            <a:picLocks noChangeAspect="1"/>
+          </p:cNvPicPr>
+          <p:nvPr/>
+        </p:nvPicPr>
+        <p:blipFill>
+          <a:blip r:embed="rId4"/>
+          <a:stretch>
+            <a:fillRect/>
+          </a:stretch>
+        </p:blipFill>
+        <p:spPr>
+          <a:xfrm>
+            <a:off x="4627244" y="2452985"/>
+            <a:ext cx="4295776" cy="756489"/>
+          </a:xfrm>
+          <a:prstGeom prst="rect">
+            <a:avLst/>
+          </a:prstGeom>
+        </p:spPr>
+      </p:pic>
+      <p:pic>
+        <p:nvPicPr>
+          <p:cNvPr id="6" name="Picture 5">
+            <a:extLst>
+              <a:ext uri="{FF2B5EF4-FFF2-40B4-BE49-F238E27FC236}">
+                <a16:creationId xmlns:a16="http://schemas.microsoft.com/office/drawing/2014/main" id="{0C8930C0-F43F-4444-89CE-5C335AD2FA7D}"/>
+              </a:ext>
+            </a:extLst>
+          </p:cNvPr>
+          <p:cNvPicPr>
+            <a:picLocks noChangeAspect="1"/>
+          </p:cNvPicPr>
+          <p:nvPr/>
+        </p:nvPicPr>
+        <p:blipFill>
+          <a:blip r:embed="rId5"/>
+          <a:stretch>
+            <a:fillRect/>
+          </a:stretch>
+        </p:blipFill>
+        <p:spPr>
+          <a:xfrm>
+            <a:off x="4583430" y="3575295"/>
+            <a:ext cx="4343400" cy="971550"/>
+          </a:xfrm>
+          <a:prstGeom prst="rect">
+            <a:avLst/>
+          </a:prstGeom>
+        </p:spPr>
+      </p:pic>
+    </p:spTree>
+    <p:extLst>
+      <p:ext uri="{BB962C8B-B14F-4D97-AF65-F5344CB8AC3E}">
+        <p14:creationId xmlns:p14="http://schemas.microsoft.com/office/powerpoint/2010/main" val="1738934978"/>
+      </p:ext>
+    </p:extLst>
+  </p:cSld>
+  <p:clrMapOvr>
+    <a:masterClrMapping/>
+  </p:clrMapOvr>
+</p:sld>
+</file>
+
+<file path=ppt/slides/slide2.xml><?xml version="1.0" encoding="utf-8"?>
+<p:sld xmlns:a="http://schemas.openxmlformats.org/drawingml/2006/main" xmlns:r="http://schemas.openxmlformats.org/officeDocument/2006/relationships" xmlns:p="http://schemas.openxmlformats.org/presentationml/2006/main">
+  <p:cSld>
+    <p:spTree>
+      <p:nvGrpSpPr>
+        <p:cNvPr id="1" name=""/>
+        <p:cNvGrpSpPr/>
+        <p:nvPr/>
+      </p:nvGrpSpPr>
+      <p:grpSpPr>
+        <a:xfrm>
+          <a:off x="0" y="0"/>
+          <a:ext cx="0" cy="0"/>
+          <a:chOff x="0" y="0"/>
+          <a:chExt cx="0" cy="0"/>
+        </a:xfrm>
+      </p:grpSpPr>
+      <p:pic>
+        <p:nvPicPr>
+          <p:cNvPr id="2050" name="Picture 2"/>
+          <p:cNvPicPr>
+            <a:picLocks noChangeAspect="1" noChangeArrowheads="1"/>
+          </p:cNvPicPr>
+          <p:nvPr/>
+        </p:nvPicPr>
+        <p:blipFill>
+          <a:blip r:embed="rId2" cstate="print"/>
+          <a:srcRect/>
+          <a:stretch>
+            <a:fillRect/>
+          </a:stretch>
+        </p:blipFill>
+        <p:spPr bwMode="auto">
+          <a:xfrm>
+            <a:off x="228600" y="452437"/>
+            <a:ext cx="5172075" cy="1676400"/>
+          </a:xfrm>
+          <a:prstGeom prst="rect">
+            <a:avLst/>
+          </a:prstGeom>
+          <a:noFill/>
+          <a:ln w="9525">
+            <a:noFill/>
+            <a:miter lim="800000"/>
+            <a:headEnd/>
+            <a:tailEnd/>
+          </a:ln>
+        </p:spPr>
+      </p:pic>
+      <p:pic>
+        <p:nvPicPr>
+          <p:cNvPr id="2051" name="Picture 3"/>
+          <p:cNvPicPr>
+            <a:picLocks noChangeAspect="1" noChangeArrowheads="1"/>
+          </p:cNvPicPr>
+          <p:nvPr/>
+        </p:nvPicPr>
+        <p:blipFill>
+          <a:blip r:embed="rId3" cstate="print"/>
+          <a:srcRect/>
+          <a:stretch>
+            <a:fillRect/>
+          </a:stretch>
+        </p:blipFill>
+        <p:spPr bwMode="auto">
+          <a:xfrm>
+            <a:off x="3657600" y="1811713"/>
+            <a:ext cx="5018039" cy="4736724"/>
+          </a:xfrm>
+          <a:prstGeom prst="rect">
+            <a:avLst/>
+          </a:prstGeom>
+          <a:noFill/>
+          <a:ln w="9525">
+            <a:noFill/>
+            <a:miter lim="800000"/>
+            <a:headEnd/>
+            <a:tailEnd/>
+          </a:ln>
+        </p:spPr>
+      </p:pic>
+      <p:sp>
+        <p:nvSpPr>
+          <p:cNvPr id="6" name="TextBox 5"/>
+          <p:cNvSpPr txBox="1"/>
+          <p:nvPr/>
+        </p:nvSpPr>
+        <p:spPr>
+          <a:xfrm>
+            <a:off x="609600" y="0"/>
+            <a:ext cx="5579091" cy="369332"/>
+          </a:xfrm>
+          <a:prstGeom prst="rect">
+            <a:avLst/>
+          </a:prstGeom>
+          <a:noFill/>
+        </p:spPr>
+        <p:txBody>
+          <a:bodyPr wrap="none" rtlCol="0">
+            <a:spAutoFit/>
+          </a:bodyPr>
+          <a:lstStyle/>
+          <a:p>
+            <a:r>
+              <a:rPr lang="en-US" dirty="0"/>
+              <a:t>Mean subtracting doesn’t much change the </a:t>
+            </a:r>
+            <a:r>
+              <a:rPr lang="en-US"/>
+              <a:t>basic shape…</a:t>
+            </a:r>
+            <a:endParaRPr lang="en-US" dirty="0"/>
+          </a:p>
+        </p:txBody>
+      </p:sp>
+      <p:sp>
+        <p:nvSpPr>
+          <p:cNvPr id="8" name="Rectangle 7"/>
+          <p:cNvSpPr/>
+          <p:nvPr/>
+        </p:nvSpPr>
+        <p:spPr>
+          <a:xfrm>
+            <a:off x="76200" y="6474023"/>
+            <a:ext cx="11658600" cy="307777"/>
+          </a:xfrm>
+          <a:prstGeom prst="rect">
+            <a:avLst/>
+          </a:prstGeom>
+        </p:spPr>
+        <p:txBody>
+          <a:bodyPr wrap="square">
+            <a:spAutoFit/>
+          </a:bodyPr>
+          <a:lstStyle/>
+          <a:p>
+            <a:r>
+              <a:rPr lang="en-US" sz="1400" dirty="0">
+                <a:latin typeface="Arial" pitchFamily="34" charset="0"/>
+                <a:cs typeface="Arial" pitchFamily="34" charset="0"/>
+              </a:rPr>
+              <a:t>https://github.com/afodor/metagenomicsTools/blob/master/src/machineLearningExamples/pcaRotation.txt</a:t>
+            </a:r>
+          </a:p>
+        </p:txBody>
+      </p:sp>
+    </p:spTree>
+  </p:cSld>
+  <p:clrMapOvr>
+    <a:masterClrMapping/>
+  </p:clrMapOvr>
+</p:sld>
+</file>
+
+<file path=ppt/slides/slide20.xml><?xml version="1.0" encoding="utf-8"?>
+<p:sld xmlns:a="http://schemas.openxmlformats.org/drawingml/2006/main" xmlns:r="http://schemas.openxmlformats.org/officeDocument/2006/relationships" xmlns:p="http://schemas.openxmlformats.org/presentationml/2006/main">
+  <p:cSld>
+    <p:spTree>
+      <p:nvGrpSpPr>
+        <p:cNvPr id="1" name=""/>
+        <p:cNvGrpSpPr/>
+        <p:nvPr/>
+      </p:nvGrpSpPr>
+      <p:grpSpPr>
+        <a:xfrm>
+          <a:off x="0" y="0"/>
+          <a:ext cx="0" cy="0"/>
+          <a:chOff x="0" y="0"/>
+          <a:chExt cx="0" cy="0"/>
+        </a:xfrm>
+      </p:grpSpPr>
+      <p:pic>
+        <p:nvPicPr>
+          <p:cNvPr id="2" name="Picture 1">
+            <a:extLst>
+              <a:ext uri="{FF2B5EF4-FFF2-40B4-BE49-F238E27FC236}">
+                <a16:creationId xmlns:a16="http://schemas.microsoft.com/office/drawing/2014/main" id="{E39542B4-AA05-4E46-9923-F4F808E92B11}"/>
+              </a:ext>
+            </a:extLst>
+          </p:cNvPr>
+          <p:cNvPicPr>
+            <a:picLocks noChangeAspect="1"/>
+          </p:cNvPicPr>
+          <p:nvPr/>
+        </p:nvPicPr>
+        <p:blipFill>
+          <a:blip r:embed="rId2"/>
+          <a:stretch>
+            <a:fillRect/>
+          </a:stretch>
+        </p:blipFill>
+        <p:spPr>
+          <a:xfrm>
+            <a:off x="381000" y="1752600"/>
+            <a:ext cx="7726560" cy="2799585"/>
+          </a:xfrm>
+          <a:prstGeom prst="rect">
+            <a:avLst/>
+          </a:prstGeom>
+        </p:spPr>
+      </p:pic>
+    </p:spTree>
+    <p:extLst>
+      <p:ext uri="{BB962C8B-B14F-4D97-AF65-F5344CB8AC3E}">
+        <p14:creationId xmlns:p14="http://schemas.microsoft.com/office/powerpoint/2010/main" val="3999768120"/>
+      </p:ext>
+    </p:extLst>
+  </p:cSld>
+  <p:clrMapOvr>
+    <a:masterClrMapping/>
+  </p:clrMapOvr>
+</p:sld>
+</file>
+
+<file path=ppt/slides/slide3.xml><?xml version="1.0" encoding="utf-8"?>
+<p:sld xmlns:a="http://schemas.openxmlformats.org/drawingml/2006/main" xmlns:r="http://schemas.openxmlformats.org/officeDocument/2006/relationships" xmlns:p="http://schemas.openxmlformats.org/presentationml/2006/main">
+  <p:cSld>
+    <p:spTree>
+      <p:nvGrpSpPr>
+        <p:cNvPr id="1" name=""/>
+        <p:cNvGrpSpPr/>
+        <p:nvPr/>
+      </p:nvGrpSpPr>
+      <p:grpSpPr>
+        <a:xfrm>
+          <a:off x="0" y="0"/>
+          <a:ext cx="0" cy="0"/>
+          <a:chOff x="0" y="0"/>
+          <a:chExt cx="0" cy="0"/>
+        </a:xfrm>
+      </p:grpSpPr>
+      <p:sp>
+        <p:nvSpPr>
+          <p:cNvPr id="4" name="TextBox 3"/>
+          <p:cNvSpPr txBox="1"/>
+          <p:nvPr/>
+        </p:nvSpPr>
+        <p:spPr>
+          <a:xfrm>
+            <a:off x="685800" y="76200"/>
+            <a:ext cx="4740016" cy="369332"/>
+          </a:xfrm>
+          <a:prstGeom prst="rect">
+            <a:avLst/>
+          </a:prstGeom>
+          <a:noFill/>
+        </p:spPr>
+        <p:txBody>
+          <a:bodyPr wrap="none" rtlCol="0">
+            <a:spAutoFit/>
+          </a:bodyPr>
+          <a:lstStyle/>
+          <a:p>
+            <a:r>
+              <a:rPr lang="en-US" dirty="0"/>
+              <a:t>We can perform the PCA via Eigen value rotation</a:t>
+            </a:r>
+          </a:p>
+        </p:txBody>
+      </p:sp>
+      <p:pic>
+        <p:nvPicPr>
+          <p:cNvPr id="3074" name="Picture 2"/>
+          <p:cNvPicPr>
+            <a:picLocks noChangeAspect="1" noChangeArrowheads="1"/>
+          </p:cNvPicPr>
+          <p:nvPr/>
+        </p:nvPicPr>
+        <p:blipFill>
+          <a:blip r:embed="rId2" cstate="print"/>
+          <a:srcRect/>
+          <a:stretch>
+            <a:fillRect/>
+          </a:stretch>
+        </p:blipFill>
+        <p:spPr bwMode="auto">
+          <a:xfrm>
+            <a:off x="609600" y="914400"/>
+            <a:ext cx="6762750" cy="428625"/>
+          </a:xfrm>
+          <a:prstGeom prst="rect">
+            <a:avLst/>
+          </a:prstGeom>
+          <a:noFill/>
+          <a:ln w="9525">
+            <a:noFill/>
+            <a:miter lim="800000"/>
+            <a:headEnd/>
+            <a:tailEnd/>
+          </a:ln>
+        </p:spPr>
+      </p:pic>
+      <p:pic>
+        <p:nvPicPr>
+          <p:cNvPr id="3075" name="Picture 3"/>
+          <p:cNvPicPr>
+            <a:picLocks noChangeAspect="1" noChangeArrowheads="1"/>
+          </p:cNvPicPr>
+          <p:nvPr/>
+        </p:nvPicPr>
+        <p:blipFill>
+          <a:blip r:embed="rId3" cstate="print"/>
+          <a:srcRect/>
+          <a:stretch>
+            <a:fillRect/>
+          </a:stretch>
+        </p:blipFill>
+        <p:spPr bwMode="auto">
+          <a:xfrm>
+            <a:off x="3048000" y="1371600"/>
+            <a:ext cx="5310187" cy="5016536"/>
+          </a:xfrm>
+          <a:prstGeom prst="rect">
+            <a:avLst/>
+          </a:prstGeom>
+          <a:noFill/>
+          <a:ln w="9525">
+            <a:noFill/>
+            <a:miter lim="800000"/>
+            <a:headEnd/>
+            <a:tailEnd/>
+          </a:ln>
+        </p:spPr>
+      </p:pic>
+      <p:sp>
+        <p:nvSpPr>
+          <p:cNvPr id="7" name="TextBox 6"/>
+          <p:cNvSpPr txBox="1"/>
+          <p:nvPr/>
+        </p:nvSpPr>
+        <p:spPr>
+          <a:xfrm>
+            <a:off x="2362200" y="457200"/>
+            <a:ext cx="2658100" cy="369332"/>
+          </a:xfrm>
+          <a:prstGeom prst="rect">
+            <a:avLst/>
+          </a:prstGeom>
+          <a:noFill/>
+        </p:spPr>
+        <p:txBody>
+          <a:bodyPr wrap="none" rtlCol="0">
+            <a:spAutoFit/>
+          </a:bodyPr>
+          <a:lstStyle/>
+          <a:p>
+            <a:r>
+              <a:rPr lang="en-US" dirty="0"/>
+              <a:t>[200,  2]    * [2,2] = [200,2]</a:t>
+            </a:r>
+          </a:p>
+        </p:txBody>
+      </p:sp>
+      <p:sp>
+        <p:nvSpPr>
+          <p:cNvPr id="8" name="Rectangle 7"/>
+          <p:cNvSpPr/>
+          <p:nvPr/>
+        </p:nvSpPr>
+        <p:spPr>
+          <a:xfrm>
+            <a:off x="76200" y="6474023"/>
+            <a:ext cx="11658600" cy="307777"/>
+          </a:xfrm>
+          <a:prstGeom prst="rect">
+            <a:avLst/>
+          </a:prstGeom>
+        </p:spPr>
+        <p:txBody>
+          <a:bodyPr wrap="square">
+            <a:spAutoFit/>
+          </a:bodyPr>
+          <a:lstStyle/>
+          <a:p>
+            <a:r>
+              <a:rPr lang="en-US" sz="1400" dirty="0">
+                <a:latin typeface="Arial" pitchFamily="34" charset="0"/>
+                <a:cs typeface="Arial" pitchFamily="34" charset="0"/>
+              </a:rPr>
+              <a:t>https://github.com/afodor/metagenomicsTools/blob/master/src/machineLearningExamples/pcaRotation.txt</a:t>
+            </a:r>
+          </a:p>
+        </p:txBody>
+      </p:sp>
+    </p:spTree>
+  </p:cSld>
+  <p:clrMapOvr>
+    <a:masterClrMapping/>
+  </p:clrMapOvr>
+</p:sld>
+</file>
+
+<file path=ppt/slides/slide4.xml><?xml version="1.0" encoding="utf-8"?>
+<p:sld xmlns:a="http://schemas.openxmlformats.org/drawingml/2006/main" xmlns:r="http://schemas.openxmlformats.org/officeDocument/2006/relationships" xmlns:p="http://schemas.openxmlformats.org/presentationml/2006/main">
+  <p:cSld>
+    <p:spTree>
+      <p:nvGrpSpPr>
+        <p:cNvPr id="1" name=""/>
+        <p:cNvGrpSpPr/>
+        <p:nvPr/>
+      </p:nvGrpSpPr>
+      <p:grpSpPr>
+        <a:xfrm>
+          <a:off x="0" y="0"/>
+          <a:ext cx="0" cy="0"/>
+          <a:chOff x="0" y="0"/>
+          <a:chExt cx="0" cy="0"/>
+        </a:xfrm>
+      </p:grpSpPr>
+      <p:sp>
+        <p:nvSpPr>
+          <p:cNvPr id="4" name="TextBox 3"/>
+          <p:cNvSpPr txBox="1"/>
+          <p:nvPr/>
+        </p:nvSpPr>
+        <p:spPr>
+          <a:xfrm>
+            <a:off x="533400" y="152400"/>
+            <a:ext cx="8305800" cy="369332"/>
+          </a:xfrm>
+          <a:prstGeom prst="rect">
+            <a:avLst/>
+          </a:prstGeom>
+          <a:noFill/>
+        </p:spPr>
+        <p:txBody>
+          <a:bodyPr wrap="square" rtlCol="0">
+            <a:spAutoFit/>
+          </a:bodyPr>
+          <a:lstStyle/>
+          <a:p>
+            <a:r>
+              <a:rPr lang="en-US" dirty="0"/>
+              <a:t>Here, we rotate it back but only use the first PCA component</a:t>
+            </a:r>
+          </a:p>
+        </p:txBody>
+      </p:sp>
+      <p:pic>
+        <p:nvPicPr>
+          <p:cNvPr id="4098" name="Picture 2"/>
+          <p:cNvPicPr>
+            <a:picLocks noChangeAspect="1" noChangeArrowheads="1"/>
+          </p:cNvPicPr>
+          <p:nvPr/>
+        </p:nvPicPr>
+        <p:blipFill>
+          <a:blip r:embed="rId2" cstate="print"/>
+          <a:srcRect/>
+          <a:stretch>
+            <a:fillRect/>
+          </a:stretch>
+        </p:blipFill>
+        <p:spPr bwMode="auto">
+          <a:xfrm>
+            <a:off x="276225" y="1000125"/>
+            <a:ext cx="7953375" cy="676275"/>
+          </a:xfrm>
+          <a:prstGeom prst="rect">
+            <a:avLst/>
+          </a:prstGeom>
+          <a:noFill/>
+          <a:ln w="9525">
+            <a:noFill/>
+            <a:miter lim="800000"/>
+            <a:headEnd/>
+            <a:tailEnd/>
+          </a:ln>
+        </p:spPr>
+      </p:pic>
+      <p:pic>
+        <p:nvPicPr>
+          <p:cNvPr id="4099" name="Picture 3"/>
+          <p:cNvPicPr>
+            <a:picLocks noChangeAspect="1" noChangeArrowheads="1"/>
+          </p:cNvPicPr>
+          <p:nvPr/>
+        </p:nvPicPr>
+        <p:blipFill>
+          <a:blip r:embed="rId3" cstate="print"/>
+          <a:srcRect/>
+          <a:stretch>
+            <a:fillRect/>
+          </a:stretch>
+        </p:blipFill>
+        <p:spPr bwMode="auto">
+          <a:xfrm>
+            <a:off x="3657600" y="1693530"/>
+            <a:ext cx="4953000" cy="4707270"/>
+          </a:xfrm>
+          <a:prstGeom prst="rect">
+            <a:avLst/>
+          </a:prstGeom>
+          <a:noFill/>
+          <a:ln w="9525">
+            <a:noFill/>
+            <a:miter lim="800000"/>
+            <a:headEnd/>
+            <a:tailEnd/>
+          </a:ln>
+        </p:spPr>
+      </p:pic>
+      <p:sp>
+        <p:nvSpPr>
+          <p:cNvPr id="7" name="TextBox 6"/>
+          <p:cNvSpPr txBox="1"/>
+          <p:nvPr/>
+        </p:nvSpPr>
+        <p:spPr>
+          <a:xfrm>
+            <a:off x="3124200" y="457200"/>
+            <a:ext cx="1067921" cy="369332"/>
+          </a:xfrm>
+          <a:prstGeom prst="rect">
+            <a:avLst/>
+          </a:prstGeom>
+          <a:noFill/>
+        </p:spPr>
+        <p:txBody>
+          <a:bodyPr wrap="none" rtlCol="0">
+            <a:spAutoFit/>
+          </a:bodyPr>
+          <a:lstStyle/>
+          <a:p>
+            <a:r>
+              <a:rPr lang="en-US" dirty="0"/>
+              <a:t>[200 * 1] </a:t>
+            </a:r>
+          </a:p>
+        </p:txBody>
+      </p:sp>
+      <p:sp>
+        <p:nvSpPr>
+          <p:cNvPr id="8" name="TextBox 7"/>
+          <p:cNvSpPr txBox="1"/>
+          <p:nvPr/>
+        </p:nvSpPr>
+        <p:spPr>
+          <a:xfrm>
+            <a:off x="4953000" y="457200"/>
+            <a:ext cx="939681" cy="369332"/>
+          </a:xfrm>
+          <a:prstGeom prst="rect">
+            <a:avLst/>
+          </a:prstGeom>
+          <a:noFill/>
+        </p:spPr>
+        <p:txBody>
+          <a:bodyPr wrap="none" rtlCol="0">
+            <a:spAutoFit/>
+          </a:bodyPr>
+          <a:lstStyle/>
+          <a:p>
+            <a:r>
+              <a:rPr lang="en-US" dirty="0"/>
+              <a:t>[ 1 * 2 ] </a:t>
+            </a:r>
+          </a:p>
+        </p:txBody>
+      </p:sp>
+      <p:sp>
+        <p:nvSpPr>
+          <p:cNvPr id="9" name="TextBox 8"/>
+          <p:cNvSpPr txBox="1"/>
+          <p:nvPr/>
+        </p:nvSpPr>
+        <p:spPr>
+          <a:xfrm>
+            <a:off x="6248400" y="457200"/>
+            <a:ext cx="1236236" cy="369332"/>
+          </a:xfrm>
+          <a:prstGeom prst="rect">
+            <a:avLst/>
+          </a:prstGeom>
+          <a:noFill/>
+        </p:spPr>
+        <p:txBody>
+          <a:bodyPr wrap="none" rtlCol="0">
+            <a:spAutoFit/>
+          </a:bodyPr>
+          <a:lstStyle/>
+          <a:p>
+            <a:r>
+              <a:rPr lang="en-US" dirty="0"/>
+              <a:t>= [200 * 2] </a:t>
+            </a:r>
+          </a:p>
+        </p:txBody>
+      </p:sp>
+      <p:sp>
+        <p:nvSpPr>
+          <p:cNvPr id="10" name="TextBox 9"/>
+          <p:cNvSpPr txBox="1"/>
+          <p:nvPr/>
+        </p:nvSpPr>
+        <p:spPr>
+          <a:xfrm>
+            <a:off x="152400" y="2438400"/>
+            <a:ext cx="2553071" cy="923330"/>
+          </a:xfrm>
+          <a:prstGeom prst="rect">
+            <a:avLst/>
+          </a:prstGeom>
+          <a:noFill/>
+        </p:spPr>
+        <p:txBody>
+          <a:bodyPr wrap="none" rtlCol="0">
+            <a:spAutoFit/>
+          </a:bodyPr>
+          <a:lstStyle/>
+          <a:p>
+            <a:r>
+              <a:rPr lang="en-US" dirty="0"/>
+              <a:t>In one linear component,</a:t>
+            </a:r>
+          </a:p>
+          <a:p>
+            <a:r>
+              <a:rPr lang="en-US" dirty="0"/>
+              <a:t>we can only hold linear</a:t>
+            </a:r>
+          </a:p>
+          <a:p>
+            <a:r>
+              <a:rPr lang="en-US" dirty="0"/>
+              <a:t>Information…</a:t>
+            </a:r>
+          </a:p>
+        </p:txBody>
+      </p:sp>
+      <p:sp>
+        <p:nvSpPr>
+          <p:cNvPr id="11" name="Rectangle 10"/>
+          <p:cNvSpPr/>
+          <p:nvPr/>
+        </p:nvSpPr>
+        <p:spPr>
+          <a:xfrm>
+            <a:off x="76200" y="6474023"/>
+            <a:ext cx="11658600" cy="307777"/>
+          </a:xfrm>
+          <a:prstGeom prst="rect">
+            <a:avLst/>
+          </a:prstGeom>
+        </p:spPr>
+        <p:txBody>
+          <a:bodyPr wrap="square">
+            <a:spAutoFit/>
+          </a:bodyPr>
+          <a:lstStyle/>
+          <a:p>
+            <a:r>
+              <a:rPr lang="en-US" sz="1400" dirty="0">
+                <a:latin typeface="Arial" pitchFamily="34" charset="0"/>
+                <a:cs typeface="Arial" pitchFamily="34" charset="0"/>
+              </a:rPr>
+              <a:t>https://github.com/afodor/metagenomicsTools/blob/master/src/machineLearningExamples/pcaRotation.txt</a:t>
+            </a:r>
+          </a:p>
+        </p:txBody>
+      </p:sp>
+    </p:spTree>
+  </p:cSld>
+  <p:clrMapOvr>
+    <a:masterClrMapping/>
+  </p:clrMapOvr>
+</p:sld>
+</file>
+
+<file path=ppt/slides/slide5.xml><?xml version="1.0" encoding="utf-8"?>
+<p:sld xmlns:a="http://schemas.openxmlformats.org/drawingml/2006/main" xmlns:r="http://schemas.openxmlformats.org/officeDocument/2006/relationships" xmlns:p="http://schemas.openxmlformats.org/presentationml/2006/main">
+  <p:cSld>
+    <p:spTree>
+      <p:nvGrpSpPr>
+        <p:cNvPr id="1" name=""/>
+        <p:cNvGrpSpPr/>
+        <p:nvPr/>
+      </p:nvGrpSpPr>
+      <p:grpSpPr>
+        <a:xfrm>
+          <a:off x="0" y="0"/>
+          <a:ext cx="0" cy="0"/>
+          <a:chOff x="0" y="0"/>
+          <a:chExt cx="0" cy="0"/>
+        </a:xfrm>
+      </p:grpSpPr>
+      <p:sp>
+        <p:nvSpPr>
+          <p:cNvPr id="4" name="TextBox 3"/>
+          <p:cNvSpPr txBox="1"/>
+          <p:nvPr/>
+        </p:nvSpPr>
+        <p:spPr>
+          <a:xfrm>
+            <a:off x="0" y="0"/>
+            <a:ext cx="7818166" cy="400110"/>
+          </a:xfrm>
+          <a:prstGeom prst="rect">
+            <a:avLst/>
+          </a:prstGeom>
+          <a:noFill/>
+        </p:spPr>
+        <p:txBody>
+          <a:bodyPr wrap="none" rtlCol="0">
+            <a:spAutoFit/>
+          </a:bodyPr>
+          <a:lstStyle/>
+          <a:p>
+            <a:r>
+              <a:rPr lang="en-US" sz="2000" dirty="0"/>
+              <a:t>Of course, if we use both components, we can get the original data back…</a:t>
+            </a:r>
+          </a:p>
+        </p:txBody>
+      </p:sp>
+      <p:pic>
+        <p:nvPicPr>
+          <p:cNvPr id="5122" name="Picture 2"/>
+          <p:cNvPicPr>
+            <a:picLocks noChangeAspect="1" noChangeArrowheads="1"/>
+          </p:cNvPicPr>
+          <p:nvPr/>
+        </p:nvPicPr>
+        <p:blipFill>
+          <a:blip r:embed="rId2" cstate="print"/>
+          <a:srcRect/>
+          <a:stretch>
+            <a:fillRect/>
+          </a:stretch>
+        </p:blipFill>
+        <p:spPr bwMode="auto">
+          <a:xfrm>
+            <a:off x="3048000" y="1447800"/>
+            <a:ext cx="5382047" cy="5105400"/>
+          </a:xfrm>
+          <a:prstGeom prst="rect">
+            <a:avLst/>
+          </a:prstGeom>
+          <a:noFill/>
+          <a:ln w="9525">
+            <a:noFill/>
+            <a:miter lim="800000"/>
+            <a:headEnd/>
+            <a:tailEnd/>
+          </a:ln>
+        </p:spPr>
+      </p:pic>
+      <p:pic>
+        <p:nvPicPr>
+          <p:cNvPr id="5123" name="Picture 3"/>
+          <p:cNvPicPr>
+            <a:picLocks noChangeAspect="1" noChangeArrowheads="1"/>
+          </p:cNvPicPr>
+          <p:nvPr/>
+        </p:nvPicPr>
+        <p:blipFill>
+          <a:blip r:embed="rId3" cstate="print"/>
+          <a:srcRect/>
+          <a:stretch>
+            <a:fillRect/>
+          </a:stretch>
+        </p:blipFill>
+        <p:spPr bwMode="auto">
+          <a:xfrm>
+            <a:off x="533400" y="838200"/>
+            <a:ext cx="8067675" cy="714375"/>
+          </a:xfrm>
+          <a:prstGeom prst="rect">
+            <a:avLst/>
+          </a:prstGeom>
+          <a:noFill/>
+          <a:ln w="9525">
+            <a:noFill/>
+            <a:miter lim="800000"/>
+            <a:headEnd/>
+            <a:tailEnd/>
+          </a:ln>
+        </p:spPr>
+      </p:pic>
+      <p:sp>
+        <p:nvSpPr>
+          <p:cNvPr id="7" name="Rectangle 6"/>
+          <p:cNvSpPr/>
+          <p:nvPr/>
+        </p:nvSpPr>
+        <p:spPr>
+          <a:xfrm>
+            <a:off x="76200" y="6553200"/>
+            <a:ext cx="11658600" cy="307777"/>
+          </a:xfrm>
+          <a:prstGeom prst="rect">
+            <a:avLst/>
+          </a:prstGeom>
+        </p:spPr>
+        <p:txBody>
+          <a:bodyPr wrap="square">
+            <a:spAutoFit/>
+          </a:bodyPr>
+          <a:lstStyle/>
+          <a:p>
+            <a:r>
+              <a:rPr lang="en-US" sz="1400" dirty="0">
+                <a:latin typeface="Arial" pitchFamily="34" charset="0"/>
+                <a:cs typeface="Arial" pitchFamily="34" charset="0"/>
+              </a:rPr>
+              <a:t>https://github.com/afodor/metagenomicsTools/blob/master/src/machineLearningExamples/pcaRotation.txt</a:t>
+            </a:r>
+          </a:p>
+        </p:txBody>
+      </p:sp>
+      <p:sp>
+        <p:nvSpPr>
+          <p:cNvPr id="8" name="TextBox 7"/>
+          <p:cNvSpPr txBox="1"/>
+          <p:nvPr/>
+        </p:nvSpPr>
+        <p:spPr>
+          <a:xfrm>
+            <a:off x="3357347" y="392668"/>
+            <a:ext cx="2720617" cy="369332"/>
+          </a:xfrm>
+          <a:prstGeom prst="rect">
+            <a:avLst/>
+          </a:prstGeom>
+          <a:noFill/>
+        </p:spPr>
+        <p:txBody>
+          <a:bodyPr wrap="none" rtlCol="0">
+            <a:spAutoFit/>
+          </a:bodyPr>
+          <a:lstStyle/>
+          <a:p>
+            <a:r>
+              <a:rPr lang="en-US" dirty="0"/>
+              <a:t>[200 * 2] * [2,2] = [200 * 2]</a:t>
+            </a:r>
+          </a:p>
+        </p:txBody>
+      </p:sp>
+    </p:spTree>
+  </p:cSld>
+  <p:clrMapOvr>
+    <a:masterClrMapping/>
+  </p:clrMapOvr>
+</p:sld>
+</file>
+
+<file path=ppt/slides/slide6.xml><?xml version="1.0" encoding="utf-8"?>
+<p:sld xmlns:a="http://schemas.openxmlformats.org/drawingml/2006/main" xmlns:r="http://schemas.openxmlformats.org/officeDocument/2006/relationships" xmlns:p="http://schemas.openxmlformats.org/presentationml/2006/main">
+  <p:cSld>
+    <p:spTree>
+      <p:nvGrpSpPr>
+        <p:cNvPr id="1" name=""/>
+        <p:cNvGrpSpPr/>
+        <p:nvPr/>
+      </p:nvGrpSpPr>
+      <p:grpSpPr>
+        <a:xfrm>
+          <a:off x="0" y="0"/>
+          <a:ext cx="0" cy="0"/>
+          <a:chOff x="0" y="0"/>
+          <a:chExt cx="0" cy="0"/>
+        </a:xfrm>
+      </p:grpSpPr>
+      <p:sp>
+        <p:nvSpPr>
+          <p:cNvPr id="4" name="TextBox 3"/>
+          <p:cNvSpPr txBox="1"/>
+          <p:nvPr/>
+        </p:nvSpPr>
+        <p:spPr>
+          <a:xfrm>
+            <a:off x="457200" y="0"/>
+            <a:ext cx="4551759" cy="369332"/>
+          </a:xfrm>
+          <a:prstGeom prst="rect">
+            <a:avLst/>
+          </a:prstGeom>
+          <a:noFill/>
+        </p:spPr>
+        <p:txBody>
+          <a:bodyPr wrap="none" rtlCol="0">
+            <a:spAutoFit/>
+          </a:bodyPr>
+          <a:lstStyle/>
+          <a:p>
+            <a:r>
+              <a:rPr lang="en-US" dirty="0"/>
+              <a:t>With alternative syntax (but identical results…)</a:t>
+            </a:r>
+          </a:p>
+        </p:txBody>
+      </p:sp>
+      <p:pic>
+        <p:nvPicPr>
+          <p:cNvPr id="6146" name="Picture 2"/>
+          <p:cNvPicPr>
+            <a:picLocks noChangeAspect="1" noChangeArrowheads="1"/>
+          </p:cNvPicPr>
+          <p:nvPr/>
+        </p:nvPicPr>
+        <p:blipFill>
+          <a:blip r:embed="rId2" cstate="print"/>
+          <a:srcRect/>
+          <a:stretch>
+            <a:fillRect/>
+          </a:stretch>
+        </p:blipFill>
+        <p:spPr bwMode="auto">
+          <a:xfrm>
+            <a:off x="381000" y="381000"/>
+            <a:ext cx="6667500" cy="1866900"/>
+          </a:xfrm>
+          <a:prstGeom prst="rect">
+            <a:avLst/>
+          </a:prstGeom>
+          <a:noFill/>
+          <a:ln w="9525">
+            <a:noFill/>
+            <a:miter lim="800000"/>
+            <a:headEnd/>
+            <a:tailEnd/>
+          </a:ln>
+        </p:spPr>
+      </p:pic>
+      <p:pic>
+        <p:nvPicPr>
+          <p:cNvPr id="6147" name="Picture 3"/>
+          <p:cNvPicPr>
+            <a:picLocks noChangeAspect="1" noChangeArrowheads="1"/>
+          </p:cNvPicPr>
+          <p:nvPr/>
+        </p:nvPicPr>
+        <p:blipFill>
+          <a:blip r:embed="rId3" cstate="print"/>
+          <a:srcRect/>
+          <a:stretch>
+            <a:fillRect/>
+          </a:stretch>
+        </p:blipFill>
+        <p:spPr bwMode="auto">
+          <a:xfrm>
+            <a:off x="4191000" y="2286000"/>
+            <a:ext cx="3999032" cy="3962400"/>
+          </a:xfrm>
+          <a:prstGeom prst="rect">
+            <a:avLst/>
+          </a:prstGeom>
+          <a:noFill/>
+          <a:ln w="9525">
+            <a:noFill/>
+            <a:miter lim="800000"/>
+            <a:headEnd/>
+            <a:tailEnd/>
+          </a:ln>
+        </p:spPr>
+      </p:pic>
+      <p:sp>
+        <p:nvSpPr>
+          <p:cNvPr id="7" name="Rectangle 6"/>
+          <p:cNvSpPr/>
+          <p:nvPr/>
+        </p:nvSpPr>
+        <p:spPr>
+          <a:xfrm>
+            <a:off x="76200" y="6474023"/>
+            <a:ext cx="11658600" cy="307777"/>
+          </a:xfrm>
+          <a:prstGeom prst="rect">
+            <a:avLst/>
+          </a:prstGeom>
+        </p:spPr>
+        <p:txBody>
+          <a:bodyPr wrap="square">
+            <a:spAutoFit/>
+          </a:bodyPr>
+          <a:lstStyle/>
+          <a:p>
+            <a:r>
+              <a:rPr lang="en-US" sz="1400" dirty="0">
+                <a:latin typeface="Arial" pitchFamily="34" charset="0"/>
+                <a:cs typeface="Arial" pitchFamily="34" charset="0"/>
+              </a:rPr>
+              <a:t>https://github.com/afodor/metagenomicsTools/blob/master/src/machineLearningExamples/pcaRotation.txt</a:t>
+            </a:r>
+          </a:p>
+        </p:txBody>
+      </p:sp>
+    </p:spTree>
+  </p:cSld>
+  <p:clrMapOvr>
+    <a:masterClrMapping/>
+  </p:clrMapOvr>
+</p:sld>
+</file>
+
+<file path=ppt/slides/slide7.xml><?xml version="1.0" encoding="utf-8"?>
+<p:sld xmlns:a="http://schemas.openxmlformats.org/drawingml/2006/main" xmlns:r="http://schemas.openxmlformats.org/officeDocument/2006/relationships" xmlns:p="http://schemas.openxmlformats.org/presentationml/2006/main">
+  <p:cSld>
+    <p:spTree>
+      <p:nvGrpSpPr>
+        <p:cNvPr id="1" name=""/>
+        <p:cNvGrpSpPr/>
+        <p:nvPr/>
+      </p:nvGrpSpPr>
+      <p:grpSpPr>
+        <a:xfrm>
+          <a:off x="0" y="0"/>
+          <a:ext cx="0" cy="0"/>
+          <a:chOff x="0" y="0"/>
+          <a:chExt cx="0" cy="0"/>
+        </a:xfrm>
+      </p:grpSpPr>
+      <p:pic>
+        <p:nvPicPr>
+          <p:cNvPr id="7170" name="Picture 2"/>
+          <p:cNvPicPr>
+            <a:picLocks noChangeAspect="1" noChangeArrowheads="1"/>
+          </p:cNvPicPr>
+          <p:nvPr/>
+        </p:nvPicPr>
+        <p:blipFill>
+          <a:blip r:embed="rId2" cstate="print"/>
+          <a:srcRect/>
+          <a:stretch>
+            <a:fillRect/>
+          </a:stretch>
+        </p:blipFill>
+        <p:spPr bwMode="auto">
+          <a:xfrm>
+            <a:off x="685800" y="609600"/>
+            <a:ext cx="7181850" cy="1085850"/>
+          </a:xfrm>
+          <a:prstGeom prst="rect">
+            <a:avLst/>
+          </a:prstGeom>
+          <a:noFill/>
+          <a:ln w="9525">
+            <a:noFill/>
+            <a:miter lim="800000"/>
+            <a:headEnd/>
+            <a:tailEnd/>
+          </a:ln>
+        </p:spPr>
+      </p:pic>
+      <p:sp>
+        <p:nvSpPr>
+          <p:cNvPr id="5" name="TextBox 4"/>
+          <p:cNvSpPr txBox="1"/>
+          <p:nvPr/>
+        </p:nvSpPr>
+        <p:spPr>
+          <a:xfrm>
+            <a:off x="457200" y="0"/>
+            <a:ext cx="4551759" cy="369332"/>
+          </a:xfrm>
+          <a:prstGeom prst="rect">
+            <a:avLst/>
+          </a:prstGeom>
+          <a:noFill/>
+        </p:spPr>
+        <p:txBody>
+          <a:bodyPr wrap="none" rtlCol="0">
+            <a:spAutoFit/>
+          </a:bodyPr>
+          <a:lstStyle/>
+          <a:p>
+            <a:r>
+              <a:rPr lang="en-US" dirty="0"/>
+              <a:t>With alternative syntax (but identical results…)</a:t>
+            </a:r>
+          </a:p>
+        </p:txBody>
+      </p:sp>
+      <p:pic>
+        <p:nvPicPr>
+          <p:cNvPr id="7171" name="Picture 3"/>
+          <p:cNvPicPr>
+            <a:picLocks noChangeAspect="1" noChangeArrowheads="1"/>
+          </p:cNvPicPr>
+          <p:nvPr/>
+        </p:nvPicPr>
+        <p:blipFill>
+          <a:blip r:embed="rId3" cstate="print"/>
+          <a:srcRect/>
+          <a:stretch>
+            <a:fillRect/>
+          </a:stretch>
+        </p:blipFill>
+        <p:spPr bwMode="auto">
+          <a:xfrm>
+            <a:off x="2971800" y="1758332"/>
+            <a:ext cx="4953000" cy="4642468"/>
+          </a:xfrm>
+          <a:prstGeom prst="rect">
+            <a:avLst/>
+          </a:prstGeom>
+          <a:noFill/>
+          <a:ln w="9525">
+            <a:noFill/>
+            <a:miter lim="800000"/>
+            <a:headEnd/>
+            <a:tailEnd/>
+          </a:ln>
+        </p:spPr>
+      </p:pic>
+      <p:sp>
+        <p:nvSpPr>
+          <p:cNvPr id="7" name="Rectangle 6"/>
+          <p:cNvSpPr/>
+          <p:nvPr/>
+        </p:nvSpPr>
+        <p:spPr>
+          <a:xfrm>
+            <a:off x="76200" y="6474023"/>
+            <a:ext cx="11658600" cy="307777"/>
+          </a:xfrm>
+          <a:prstGeom prst="rect">
+            <a:avLst/>
+          </a:prstGeom>
+        </p:spPr>
+        <p:txBody>
+          <a:bodyPr wrap="square">
+            <a:spAutoFit/>
+          </a:bodyPr>
+          <a:lstStyle/>
+          <a:p>
+            <a:r>
+              <a:rPr lang="en-US" sz="1400" dirty="0">
+                <a:latin typeface="Arial" pitchFamily="34" charset="0"/>
+                <a:cs typeface="Arial" pitchFamily="34" charset="0"/>
+              </a:rPr>
+              <a:t>https://github.com/afodor/metagenomicsTools/blob/master/src/machineLearningExamples/pcaRotation.txt</a:t>
+            </a:r>
+          </a:p>
+        </p:txBody>
+      </p:sp>
+    </p:spTree>
+  </p:cSld>
+  <p:clrMapOvr>
+    <a:masterClrMapping/>
+  </p:clrMapOvr>
+</p:sld>
+</file>
+
+<file path=ppt/slides/slide8.xml><?xml version="1.0" encoding="utf-8"?>
+<p:sld xmlns:a="http://schemas.openxmlformats.org/drawingml/2006/main" xmlns:r="http://schemas.openxmlformats.org/officeDocument/2006/relationships" xmlns:p="http://schemas.openxmlformats.org/presentationml/2006/main">
+  <p:cSld>
+    <p:spTree>
+      <p:nvGrpSpPr>
+        <p:cNvPr id="1" name=""/>
+        <p:cNvGrpSpPr/>
+        <p:nvPr/>
+      </p:nvGrpSpPr>
+      <p:grpSpPr>
+        <a:xfrm>
+          <a:off x="0" y="0"/>
+          <a:ext cx="0" cy="0"/>
+          <a:chOff x="0" y="0"/>
+          <a:chExt cx="0" cy="0"/>
+        </a:xfrm>
+      </p:grpSpPr>
+      <p:sp>
+        <p:nvSpPr>
+          <p:cNvPr id="5" name="TextBox 4"/>
+          <p:cNvSpPr txBox="1"/>
+          <p:nvPr/>
+        </p:nvSpPr>
+        <p:spPr>
+          <a:xfrm>
+            <a:off x="457200" y="0"/>
+            <a:ext cx="4551759" cy="369332"/>
+          </a:xfrm>
+          <a:prstGeom prst="rect">
+            <a:avLst/>
+          </a:prstGeom>
+          <a:noFill/>
+        </p:spPr>
+        <p:txBody>
+          <a:bodyPr wrap="none" rtlCol="0">
+            <a:spAutoFit/>
+          </a:bodyPr>
+          <a:lstStyle/>
+          <a:p>
+            <a:r>
+              <a:rPr lang="en-US" dirty="0"/>
+              <a:t>With alternative syntax (but identical results…)</a:t>
+            </a:r>
+          </a:p>
+        </p:txBody>
+      </p:sp>
+      <p:pic>
+        <p:nvPicPr>
+          <p:cNvPr id="8194" name="Picture 2"/>
+          <p:cNvPicPr>
+            <a:picLocks noChangeAspect="1" noChangeArrowheads="1"/>
+          </p:cNvPicPr>
+          <p:nvPr/>
+        </p:nvPicPr>
+        <p:blipFill>
+          <a:blip r:embed="rId2" cstate="print"/>
+          <a:srcRect/>
+          <a:stretch>
+            <a:fillRect/>
+          </a:stretch>
+        </p:blipFill>
+        <p:spPr bwMode="auto">
+          <a:xfrm>
+            <a:off x="1066800" y="533400"/>
+            <a:ext cx="7086600" cy="704850"/>
+          </a:xfrm>
+          <a:prstGeom prst="rect">
+            <a:avLst/>
+          </a:prstGeom>
+          <a:noFill/>
+          <a:ln w="9525">
+            <a:noFill/>
+            <a:miter lim="800000"/>
+            <a:headEnd/>
+            <a:tailEnd/>
+          </a:ln>
+        </p:spPr>
+      </p:pic>
+      <p:pic>
+        <p:nvPicPr>
+          <p:cNvPr id="8195" name="Picture 3"/>
+          <p:cNvPicPr>
+            <a:picLocks noChangeAspect="1" noChangeArrowheads="1"/>
+          </p:cNvPicPr>
+          <p:nvPr/>
+        </p:nvPicPr>
+        <p:blipFill>
+          <a:blip r:embed="rId3" cstate="print"/>
+          <a:srcRect/>
+          <a:stretch>
+            <a:fillRect/>
+          </a:stretch>
+        </p:blipFill>
+        <p:spPr bwMode="auto">
+          <a:xfrm>
+            <a:off x="2590800" y="1143000"/>
+            <a:ext cx="5210573" cy="5095875"/>
+          </a:xfrm>
+          <a:prstGeom prst="rect">
+            <a:avLst/>
+          </a:prstGeom>
+          <a:noFill/>
+          <a:ln w="9525">
+            <a:noFill/>
+            <a:miter lim="800000"/>
+            <a:headEnd/>
+            <a:tailEnd/>
+          </a:ln>
+        </p:spPr>
+      </p:pic>
+      <p:sp>
+        <p:nvSpPr>
+          <p:cNvPr id="9" name="Rectangle 8"/>
+          <p:cNvSpPr/>
+          <p:nvPr/>
+        </p:nvSpPr>
+        <p:spPr>
+          <a:xfrm>
+            <a:off x="76200" y="6474023"/>
+            <a:ext cx="11658600" cy="307777"/>
+          </a:xfrm>
+          <a:prstGeom prst="rect">
+            <a:avLst/>
+          </a:prstGeom>
+        </p:spPr>
+        <p:txBody>
+          <a:bodyPr wrap="square">
+            <a:spAutoFit/>
+          </a:bodyPr>
+          <a:lstStyle/>
+          <a:p>
+            <a:r>
+              <a:rPr lang="en-US" sz="1400" dirty="0">
+                <a:latin typeface="Arial" pitchFamily="34" charset="0"/>
+                <a:cs typeface="Arial" pitchFamily="34" charset="0"/>
+              </a:rPr>
+              <a:t>https://github.com/afodor/metagenomicsTools/blob/master/src/machineLearningExamples/pcaRotation.txt</a:t>
+            </a:r>
+          </a:p>
+        </p:txBody>
+      </p:sp>
+    </p:spTree>
+  </p:cSld>
+  <p:clrMapOvr>
+    <a:masterClrMapping/>
+  </p:clrMapOvr>
+</p:sld>
+</file>
+
+<file path=ppt/slides/slide9.xml><?xml version="1.0" encoding="utf-8"?>
+<p:sld xmlns:a="http://schemas.openxmlformats.org/drawingml/2006/main" xmlns:r="http://schemas.openxmlformats.org/officeDocument/2006/relationships" xmlns:p="http://schemas.openxmlformats.org/presentationml/2006/main">
+  <p:cSld>
+    <p:spTree>
+      <p:nvGrpSpPr>
+        <p:cNvPr id="1" name=""/>
+        <p:cNvGrpSpPr/>
+        <p:nvPr/>
+      </p:nvGrpSpPr>
+      <p:grpSpPr>
+        <a:xfrm>
+          <a:off x="0" y="0"/>
+          <a:ext cx="0" cy="0"/>
+          <a:chOff x="0" y="0"/>
+          <a:chExt cx="0" cy="0"/>
+        </a:xfrm>
+      </p:grpSpPr>
+      <p:pic>
+        <p:nvPicPr>
+          <p:cNvPr id="75778" name="Picture 3">
+            <a:extLst>
+              <a:ext uri="{FF2B5EF4-FFF2-40B4-BE49-F238E27FC236}">
+                <a16:creationId xmlns:a16="http://schemas.microsoft.com/office/drawing/2014/main" id="{52DBCA38-2D4C-442C-83FC-6A9A3F41C409}"/>
+              </a:ext>
+            </a:extLst>
+          </p:cNvPr>
+          <p:cNvPicPr>
+            <a:picLocks noChangeAspect="1" noChangeArrowheads="1"/>
+          </p:cNvPicPr>
+          <p:nvPr/>
+        </p:nvPicPr>
+        <p:blipFill>
+          <a:blip r:embed="rId3">
+            <a:extLst>
+              <a:ext uri="{28A0092B-C50C-407E-A947-70E740481C1C}">
+                <a14:useLocalDpi xmlns:a14="http://schemas.microsoft.com/office/drawing/2010/main" val="0"/>
+              </a:ext>
+            </a:extLst>
+          </a:blip>
+          <a:srcRect/>
+          <a:stretch>
+            <a:fillRect/>
+          </a:stretch>
+        </p:blipFill>
+        <p:spPr bwMode="auto">
+          <a:xfrm>
+            <a:off x="57150" y="449263"/>
+            <a:ext cx="8553450" cy="6027737"/>
+          </a:xfrm>
+          <a:prstGeom prst="rect">
+            <a:avLst/>
+          </a:prstGeom>
+          <a:noFill/>
+          <a:ln>
+            <a:noFill/>
+          </a:ln>
+          <a:extLst>
+            <a:ext uri="{909E8E84-426E-40DD-AFC4-6F175D3DCCD1}">
+              <a14:hiddenFill xmlns:a14="http://schemas.microsoft.com/office/drawing/2010/main">
+                <a:solidFill>
+                  <a:srgbClr val="FFFFFF"/>
+                </a:solidFill>
+              </a14:hiddenFill>
+            </a:ext>
+            <a:ext uri="{91240B29-F687-4F45-9708-019B960494DF}">
+              <a14:hiddenLine xmlns:a14="http://schemas.microsoft.com/office/drawing/2010/main" w="9525">
+                <a:solidFill>
+                  <a:srgbClr val="000000"/>
+                </a:solidFill>
+                <a:miter lim="800000"/>
+                <a:headEnd/>
+                <a:tailEnd/>
+              </a14:hiddenLine>
+            </a:ext>
+          </a:extLst>
+        </p:spPr>
+      </p:pic>
+      <p:sp>
+        <p:nvSpPr>
+          <p:cNvPr id="75779" name="TextBox 3">
+            <a:extLst>
+              <a:ext uri="{FF2B5EF4-FFF2-40B4-BE49-F238E27FC236}">
+                <a16:creationId xmlns:a16="http://schemas.microsoft.com/office/drawing/2014/main" id="{413908F6-2BF4-4E04-94CE-342295FCE521}"/>
+              </a:ext>
+            </a:extLst>
+          </p:cNvPr>
+          <p:cNvSpPr txBox="1">
+            <a:spLocks noChangeArrowheads="1"/>
+          </p:cNvSpPr>
+          <p:nvPr/>
+        </p:nvSpPr>
+        <p:spPr bwMode="auto">
+          <a:xfrm>
+            <a:off x="228600" y="76200"/>
+            <a:ext cx="3230563" cy="369888"/>
+          </a:xfrm>
+          <a:prstGeom prst="rect">
+            <a:avLst/>
+          </a:prstGeom>
+          <a:noFill/>
+          <a:ln>
+            <a:noFill/>
+          </a:ln>
+          <a:extLst>
+            <a:ext uri="{909E8E84-426E-40DD-AFC4-6F175D3DCCD1}">
+              <a14:hiddenFill xmlns:a14="http://schemas.microsoft.com/office/drawing/2010/main">
+                <a:solidFill>
+                  <a:srgbClr val="FFFFFF"/>
+                </a:solidFill>
+              </a14:hiddenFill>
+            </a:ext>
+            <a:ext uri="{91240B29-F687-4F45-9708-019B960494DF}">
+              <a14:hiddenLine xmlns:a14="http://schemas.microsoft.com/office/drawing/2010/main" w="9525">
+                <a:solidFill>
+                  <a:srgbClr val="000000"/>
+                </a:solidFill>
+                <a:miter lim="800000"/>
+                <a:headEnd/>
+                <a:tailEnd/>
+              </a14:hiddenLine>
+            </a:ext>
+          </a:extLst>
+        </p:spPr>
+        <p:txBody>
+          <a:bodyPr wrap="none">
+            <a:spAutoFit/>
+          </a:bodyPr>
+          <a:lstStyle>
+            <a:lvl1pPr>
+              <a:defRPr sz="2400">
+                <a:solidFill>
+                  <a:schemeClr val="tx1"/>
+                </a:solidFill>
+                <a:latin typeface="Times New Roman" panose="02020603050405020304" pitchFamily="18" charset="0"/>
+              </a:defRPr>
+            </a:lvl1pPr>
+            <a:lvl2pPr marL="742950" indent="-285750">
+              <a:defRPr sz="2400">
+                <a:solidFill>
+                  <a:schemeClr val="tx1"/>
+                </a:solidFill>
+                <a:latin typeface="Times New Roman" panose="02020603050405020304" pitchFamily="18" charset="0"/>
+              </a:defRPr>
+            </a:lvl2pPr>
+            <a:lvl3pPr marL="1143000" indent="-228600">
+              <a:defRPr sz="2400">
+                <a:solidFill>
+                  <a:schemeClr val="tx1"/>
+                </a:solidFill>
+                <a:latin typeface="Times New Roman" panose="02020603050405020304" pitchFamily="18" charset="0"/>
+              </a:defRPr>
+            </a:lvl3pPr>
+            <a:lvl4pPr marL="1600200" indent="-228600">
+              <a:defRPr sz="2400">
+                <a:solidFill>
+                  <a:schemeClr val="tx1"/>
+                </a:solidFill>
+                <a:latin typeface="Times New Roman" panose="02020603050405020304" pitchFamily="18" charset="0"/>
+              </a:defRPr>
+            </a:lvl4pPr>
+            <a:lvl5pPr marL="2057400" indent="-228600">
+              <a:defRPr sz="2400">
+                <a:solidFill>
+                  <a:schemeClr val="tx1"/>
+                </a:solidFill>
+                <a:latin typeface="Times New Roman" panose="02020603050405020304" pitchFamily="18" charset="0"/>
+              </a:defRPr>
+            </a:lvl5pPr>
+            <a:lvl6pPr marL="2514600" indent="-228600" eaLnBrk="0" fontAlgn="base" hangingPunct="0">
+              <a:spcBef>
+                <a:spcPct val="0"/>
+              </a:spcBef>
+              <a:spcAft>
+                <a:spcPct val="0"/>
+              </a:spcAft>
+              <a:defRPr sz="2400">
+                <a:solidFill>
+                  <a:schemeClr val="tx1"/>
+                </a:solidFill>
+                <a:latin typeface="Times New Roman" panose="02020603050405020304" pitchFamily="18" charset="0"/>
+              </a:defRPr>
+            </a:lvl6pPr>
+            <a:lvl7pPr marL="2971800" indent="-228600" eaLnBrk="0" fontAlgn="base" hangingPunct="0">
+              <a:spcBef>
+                <a:spcPct val="0"/>
+              </a:spcBef>
+              <a:spcAft>
+                <a:spcPct val="0"/>
+              </a:spcAft>
+              <a:defRPr sz="2400">
+                <a:solidFill>
+                  <a:schemeClr val="tx1"/>
+                </a:solidFill>
+                <a:latin typeface="Times New Roman" panose="02020603050405020304" pitchFamily="18" charset="0"/>
+              </a:defRPr>
+            </a:lvl7pPr>
+            <a:lvl8pPr marL="3429000" indent="-228600" eaLnBrk="0" fontAlgn="base" hangingPunct="0">
+              <a:spcBef>
+                <a:spcPct val="0"/>
+              </a:spcBef>
+              <a:spcAft>
+                <a:spcPct val="0"/>
+              </a:spcAft>
+              <a:defRPr sz="2400">
+                <a:solidFill>
+                  <a:schemeClr val="tx1"/>
+                </a:solidFill>
+                <a:latin typeface="Times New Roman" panose="02020603050405020304" pitchFamily="18" charset="0"/>
+              </a:defRPr>
+            </a:lvl8pPr>
+            <a:lvl9pPr marL="3886200" indent="-228600" eaLnBrk="0" fontAlgn="base" hangingPunct="0">
+              <a:spcBef>
+                <a:spcPct val="0"/>
+              </a:spcBef>
+              <a:spcAft>
+                <a:spcPct val="0"/>
+              </a:spcAft>
+              <a:defRPr sz="2400">
+                <a:solidFill>
+                  <a:schemeClr val="tx1"/>
+                </a:solidFill>
+                <a:latin typeface="Times New Roman" panose="02020603050405020304" pitchFamily="18" charset="0"/>
+              </a:defRPr>
+            </a:lvl9pPr>
+          </a:lstStyle>
+          <a:p>
+            <a:r>
+              <a:rPr lang="en-US" altLang="en-US"/>
+              <a:t>Let’s return to the gala dataset…</a:t>
+            </a:r>
+          </a:p>
+        </p:txBody>
+      </p:sp>
+      <p:cxnSp>
+        <p:nvCxnSpPr>
+          <p:cNvPr id="6" name="Straight Arrow Connector 5">
+            <a:extLst>
+              <a:ext uri="{FF2B5EF4-FFF2-40B4-BE49-F238E27FC236}">
+                <a16:creationId xmlns:a16="http://schemas.microsoft.com/office/drawing/2014/main" id="{5A789A2B-1A08-4E73-B6EE-C1BC930AEE8F}"/>
+              </a:ext>
+            </a:extLst>
+          </p:cNvPr>
+          <p:cNvCxnSpPr/>
+          <p:nvPr/>
+        </p:nvCxnSpPr>
+        <p:spPr>
+          <a:xfrm rot="5400000" flipH="1" flipV="1">
+            <a:off x="2857501" y="6515100"/>
+            <a:ext cx="381000" cy="3175"/>
+          </a:xfrm>
+          <a:prstGeom prst="straightConnector1">
+            <a:avLst/>
+          </a:prstGeom>
+          <a:ln>
+            <a:tailEnd type="arrow"/>
+          </a:ln>
+        </p:spPr>
+        <p:style>
+          <a:lnRef idx="1">
+            <a:schemeClr val="accent1"/>
+          </a:lnRef>
+          <a:fillRef idx="0">
+            <a:schemeClr val="accent1"/>
+          </a:fillRef>
+          <a:effectRef idx="0">
+            <a:schemeClr val="accent1"/>
+          </a:effectRef>
+          <a:fontRef idx="minor">
+            <a:schemeClr val="tx1"/>
+          </a:fontRef>
+        </p:style>
+      </p:cxnSp>
+      <p:sp>
+        <p:nvSpPr>
+          <p:cNvPr id="75781" name="TextBox 6">
+            <a:extLst>
+              <a:ext uri="{FF2B5EF4-FFF2-40B4-BE49-F238E27FC236}">
+                <a16:creationId xmlns:a16="http://schemas.microsoft.com/office/drawing/2014/main" id="{E64B31C3-3347-47B9-B38E-B85D84C74B98}"/>
+              </a:ext>
+            </a:extLst>
+          </p:cNvPr>
+          <p:cNvSpPr txBox="1">
+            <a:spLocks noChangeArrowheads="1"/>
+          </p:cNvSpPr>
+          <p:nvPr/>
+        </p:nvSpPr>
+        <p:spPr bwMode="auto">
+          <a:xfrm>
+            <a:off x="708025" y="6477000"/>
+            <a:ext cx="5616575" cy="369888"/>
+          </a:xfrm>
+          <a:prstGeom prst="rect">
+            <a:avLst/>
+          </a:prstGeom>
+          <a:noFill/>
+          <a:ln>
+            <a:noFill/>
+          </a:ln>
+          <a:extLst>
+            <a:ext uri="{909E8E84-426E-40DD-AFC4-6F175D3DCCD1}">
+              <a14:hiddenFill xmlns:a14="http://schemas.microsoft.com/office/drawing/2010/main">
+                <a:solidFill>
+                  <a:srgbClr val="FFFFFF"/>
+                </a:solidFill>
+              </a14:hiddenFill>
+            </a:ext>
+            <a:ext uri="{91240B29-F687-4F45-9708-019B960494DF}">
+              <a14:hiddenLine xmlns:a14="http://schemas.microsoft.com/office/drawing/2010/main" w="9525">
+                <a:solidFill>
+                  <a:srgbClr val="000000"/>
+                </a:solidFill>
+                <a:miter lim="800000"/>
+                <a:headEnd/>
+                <a:tailEnd/>
+              </a14:hiddenLine>
+            </a:ext>
+          </a:extLst>
+        </p:spPr>
+        <p:txBody>
+          <a:bodyPr wrap="none">
+            <a:spAutoFit/>
+          </a:bodyPr>
+          <a:lstStyle>
+            <a:lvl1pPr>
+              <a:defRPr sz="2400">
+                <a:solidFill>
+                  <a:schemeClr val="tx1"/>
+                </a:solidFill>
+                <a:latin typeface="Times New Roman" panose="02020603050405020304" pitchFamily="18" charset="0"/>
+              </a:defRPr>
+            </a:lvl1pPr>
+            <a:lvl2pPr marL="742950" indent="-285750">
+              <a:defRPr sz="2400">
+                <a:solidFill>
+                  <a:schemeClr val="tx1"/>
+                </a:solidFill>
+                <a:latin typeface="Times New Roman" panose="02020603050405020304" pitchFamily="18" charset="0"/>
+              </a:defRPr>
+            </a:lvl2pPr>
+            <a:lvl3pPr marL="1143000" indent="-228600">
+              <a:defRPr sz="2400">
+                <a:solidFill>
+                  <a:schemeClr val="tx1"/>
+                </a:solidFill>
+                <a:latin typeface="Times New Roman" panose="02020603050405020304" pitchFamily="18" charset="0"/>
+              </a:defRPr>
+            </a:lvl3pPr>
+            <a:lvl4pPr marL="1600200" indent="-228600">
+              <a:defRPr sz="2400">
+                <a:solidFill>
+                  <a:schemeClr val="tx1"/>
+                </a:solidFill>
+                <a:latin typeface="Times New Roman" panose="02020603050405020304" pitchFamily="18" charset="0"/>
+              </a:defRPr>
+            </a:lvl4pPr>
+            <a:lvl5pPr marL="2057400" indent="-228600">
+              <a:defRPr sz="2400">
+                <a:solidFill>
+                  <a:schemeClr val="tx1"/>
+                </a:solidFill>
+                <a:latin typeface="Times New Roman" panose="02020603050405020304" pitchFamily="18" charset="0"/>
+              </a:defRPr>
+            </a:lvl5pPr>
+            <a:lvl6pPr marL="2514600" indent="-228600" eaLnBrk="0" fontAlgn="base" hangingPunct="0">
+              <a:spcBef>
+                <a:spcPct val="0"/>
+              </a:spcBef>
+              <a:spcAft>
+                <a:spcPct val="0"/>
+              </a:spcAft>
+              <a:defRPr sz="2400">
+                <a:solidFill>
+                  <a:schemeClr val="tx1"/>
+                </a:solidFill>
+                <a:latin typeface="Times New Roman" panose="02020603050405020304" pitchFamily="18" charset="0"/>
+              </a:defRPr>
+            </a:lvl6pPr>
+            <a:lvl7pPr marL="2971800" indent="-228600" eaLnBrk="0" fontAlgn="base" hangingPunct="0">
+              <a:spcBef>
+                <a:spcPct val="0"/>
+              </a:spcBef>
+              <a:spcAft>
+                <a:spcPct val="0"/>
+              </a:spcAft>
+              <a:defRPr sz="2400">
+                <a:solidFill>
+                  <a:schemeClr val="tx1"/>
+                </a:solidFill>
+                <a:latin typeface="Times New Roman" panose="02020603050405020304" pitchFamily="18" charset="0"/>
+              </a:defRPr>
+            </a:lvl7pPr>
+            <a:lvl8pPr marL="3429000" indent="-228600" eaLnBrk="0" fontAlgn="base" hangingPunct="0">
+              <a:spcBef>
+                <a:spcPct val="0"/>
+              </a:spcBef>
+              <a:spcAft>
+                <a:spcPct val="0"/>
+              </a:spcAft>
+              <a:defRPr sz="2400">
+                <a:solidFill>
+                  <a:schemeClr val="tx1"/>
+                </a:solidFill>
+                <a:latin typeface="Times New Roman" panose="02020603050405020304" pitchFamily="18" charset="0"/>
+              </a:defRPr>
+            </a:lvl8pPr>
+            <a:lvl9pPr marL="3886200" indent="-228600" eaLnBrk="0" fontAlgn="base" hangingPunct="0">
+              <a:spcBef>
+                <a:spcPct val="0"/>
+              </a:spcBef>
+              <a:spcAft>
+                <a:spcPct val="0"/>
+              </a:spcAft>
+              <a:defRPr sz="2400">
+                <a:solidFill>
+                  <a:schemeClr val="tx1"/>
+                </a:solidFill>
+                <a:latin typeface="Times New Roman" panose="02020603050405020304" pitchFamily="18" charset="0"/>
+              </a:defRPr>
+            </a:lvl9pPr>
+          </a:lstStyle>
+          <a:p>
+            <a:r>
+              <a:rPr lang="en-US" altLang="en-US" dirty="0"/>
+              <a:t>There are only 2-3 columns of non-redundant information </a:t>
+            </a:r>
+          </a:p>
+        </p:txBody>
+      </p:sp>
+    </p:spTree>
   </p:cSld>
   <p:clrMapOvr>
     <a:masterClrMapping/>

</xml_diff>